<commit_message>
Add httpfactory for client
</commit_message>
<xml_diff>
--- a/Slides/6. Day 5 - API.pptx
+++ b/Slides/6. Day 5 - API.pptx
@@ -5,24 +5,27 @@
     <p:sldMasterId id="2147483660" r:id="rId1"/>
   </p:sldMasterIdLst>
   <p:notesMasterIdLst>
-    <p:notesMasterId r:id="rId17"/>
+    <p:notesMasterId r:id="rId20"/>
   </p:notesMasterIdLst>
   <p:sldIdLst>
     <p:sldId id="256" r:id="rId2"/>
-    <p:sldId id="261" r:id="rId3"/>
-    <p:sldId id="257" r:id="rId4"/>
-    <p:sldId id="259" r:id="rId5"/>
-    <p:sldId id="258" r:id="rId6"/>
-    <p:sldId id="260" r:id="rId7"/>
-    <p:sldId id="262" r:id="rId8"/>
-    <p:sldId id="263" r:id="rId9"/>
-    <p:sldId id="264" r:id="rId10"/>
-    <p:sldId id="265" r:id="rId11"/>
-    <p:sldId id="266" r:id="rId12"/>
-    <p:sldId id="267" r:id="rId13"/>
-    <p:sldId id="269" r:id="rId14"/>
-    <p:sldId id="268" r:id="rId15"/>
-    <p:sldId id="270" r:id="rId16"/>
+    <p:sldId id="271" r:id="rId3"/>
+    <p:sldId id="272" r:id="rId4"/>
+    <p:sldId id="261" r:id="rId5"/>
+    <p:sldId id="257" r:id="rId6"/>
+    <p:sldId id="259" r:id="rId7"/>
+    <p:sldId id="258" r:id="rId8"/>
+    <p:sldId id="260" r:id="rId9"/>
+    <p:sldId id="262" r:id="rId10"/>
+    <p:sldId id="263" r:id="rId11"/>
+    <p:sldId id="264" r:id="rId12"/>
+    <p:sldId id="265" r:id="rId13"/>
+    <p:sldId id="266" r:id="rId14"/>
+    <p:sldId id="267" r:id="rId15"/>
+    <p:sldId id="274" r:id="rId16"/>
+    <p:sldId id="273" r:id="rId17"/>
+    <p:sldId id="269" r:id="rId18"/>
+    <p:sldId id="268" r:id="rId19"/>
   </p:sldIdLst>
   <p:sldSz cx="12192000" cy="6858000"/>
   <p:notesSz cx="6858000" cy="9144000"/>
@@ -211,7 +214,7 @@
           <a:p>
             <a:fld id="{17E3E604-852F-43F4-9076-D355F537D5E3}" type="datetimeFigureOut">
               <a:rPr lang="en-US" smtClean="0"/>
-              <a:t>6/1/2025</a:t>
+              <a:t>6/11/2025</a:t>
             </a:fld>
             <a:endParaRPr lang="en-US"/>
           </a:p>
@@ -552,7 +555,7 @@
           <a:p>
             <a:fld id="{9DC867DB-6213-4824-9BD0-88F7DBDCA036}" type="slidenum">
               <a:rPr lang="en-US" smtClean="0"/>
-              <a:t>3</a:t>
+              <a:t>5</a:t>
             </a:fld>
             <a:endParaRPr lang="en-US"/>
           </a:p>
@@ -645,7 +648,7 @@
           <a:p>
             <a:fld id="{9DC867DB-6213-4824-9BD0-88F7DBDCA036}" type="slidenum">
               <a:rPr lang="en-US" smtClean="0"/>
-              <a:t>5</a:t>
+              <a:t>7</a:t>
             </a:fld>
             <a:endParaRPr lang="en-US"/>
           </a:p>
@@ -759,6 +762,15 @@
             </a:r>
           </a:p>
           <a:p>
+            <a:pPr marL="685800" lvl="1" indent="-228600">
+              <a:buAutoNum type="arabicPeriod"/>
+            </a:pPr>
+            <a:r>
+              <a:rPr lang="en-US" dirty="0"/>
+              <a:t>Remove “Configure for HTTPS”</a:t>
+            </a:r>
+          </a:p>
+          <a:p>
             <a:pPr marL="228600" indent="-228600">
               <a:buAutoNum type="arabicPeriod"/>
             </a:pPr>
@@ -908,7 +920,7 @@
           <a:p>
             <a:fld id="{9DC867DB-6213-4824-9BD0-88F7DBDCA036}" type="slidenum">
               <a:rPr lang="en-US" smtClean="0"/>
-              <a:t>7</a:t>
+              <a:t>9</a:t>
             </a:fld>
             <a:endParaRPr lang="en-US"/>
           </a:p>
@@ -1097,7 +1109,7 @@
           <a:p>
             <a:fld id="{9DC867DB-6213-4824-9BD0-88F7DBDCA036}" type="slidenum">
               <a:rPr lang="en-US" smtClean="0"/>
-              <a:t>11</a:t>
+              <a:t>13</a:t>
             </a:fld>
             <a:endParaRPr lang="en-US"/>
           </a:p>
@@ -1220,7 +1232,7 @@
           <a:p>
             <a:fld id="{9DC867DB-6213-4824-9BD0-88F7DBDCA036}" type="slidenum">
               <a:rPr lang="en-US" smtClean="0"/>
-              <a:t>12</a:t>
+              <a:t>14</a:t>
             </a:fld>
             <a:endParaRPr lang="en-US"/>
           </a:p>
@@ -1304,7 +1316,7 @@
           <a:p>
             <a:fld id="{9DC867DB-6213-4824-9BD0-88F7DBDCA036}" type="slidenum">
               <a:rPr lang="en-US" smtClean="0"/>
-              <a:t>14</a:t>
+              <a:t>18</a:t>
             </a:fld>
             <a:endParaRPr lang="en-US"/>
           </a:p>
@@ -2045,7 +2057,7 @@
           <a:p>
             <a:fld id="{A3B60447-59FD-4F5A-802E-A12DF6F2A149}" type="datetimeFigureOut">
               <a:rPr lang="en-US" smtClean="0"/>
-              <a:t>6/1/2025</a:t>
+              <a:t>6/11/2025</a:t>
             </a:fld>
             <a:endParaRPr lang="en-US"/>
           </a:p>
@@ -2296,7 +2308,7 @@
           <a:p>
             <a:fld id="{A3B60447-59FD-4F5A-802E-A12DF6F2A149}" type="datetimeFigureOut">
               <a:rPr lang="en-US" smtClean="0"/>
-              <a:t>6/1/2025</a:t>
+              <a:t>6/11/2025</a:t>
             </a:fld>
             <a:endParaRPr lang="en-US"/>
           </a:p>
@@ -2610,7 +2622,7 @@
           <a:p>
             <a:fld id="{A3B60447-59FD-4F5A-802E-A12DF6F2A149}" type="datetimeFigureOut">
               <a:rPr lang="en-US" smtClean="0"/>
-              <a:t>6/1/2025</a:t>
+              <a:t>6/11/2025</a:t>
             </a:fld>
             <a:endParaRPr lang="en-US"/>
           </a:p>
@@ -2951,7 +2963,7 @@
           <a:p>
             <a:fld id="{A3B60447-59FD-4F5A-802E-A12DF6F2A149}" type="datetimeFigureOut">
               <a:rPr lang="en-US" smtClean="0"/>
-              <a:t>6/1/2025</a:t>
+              <a:t>6/11/2025</a:t>
             </a:fld>
             <a:endParaRPr lang="en-US"/>
           </a:p>
@@ -3265,7 +3277,7 @@
           <a:p>
             <a:fld id="{A3B60447-59FD-4F5A-802E-A12DF6F2A149}" type="datetimeFigureOut">
               <a:rPr lang="en-US" smtClean="0"/>
-              <a:t>6/1/2025</a:t>
+              <a:t>6/11/2025</a:t>
             </a:fld>
             <a:endParaRPr lang="en-US"/>
           </a:p>
@@ -3658,7 +3670,7 @@
           <a:p>
             <a:fld id="{A3B60447-59FD-4F5A-802E-A12DF6F2A149}" type="datetimeFigureOut">
               <a:rPr lang="en-US" smtClean="0"/>
-              <a:t>6/1/2025</a:t>
+              <a:t>6/11/2025</a:t>
             </a:fld>
             <a:endParaRPr lang="en-US"/>
           </a:p>
@@ -3828,7 +3840,7 @@
           <a:p>
             <a:fld id="{A3B60447-59FD-4F5A-802E-A12DF6F2A149}" type="datetimeFigureOut">
               <a:rPr lang="en-US" smtClean="0"/>
-              <a:t>6/1/2025</a:t>
+              <a:t>6/11/2025</a:t>
             </a:fld>
             <a:endParaRPr lang="en-US"/>
           </a:p>
@@ -4008,7 +4020,7 @@
           <a:p>
             <a:fld id="{A3B60447-59FD-4F5A-802E-A12DF6F2A149}" type="datetimeFigureOut">
               <a:rPr lang="en-US" smtClean="0"/>
-              <a:t>6/1/2025</a:t>
+              <a:t>6/11/2025</a:t>
             </a:fld>
             <a:endParaRPr lang="en-US"/>
           </a:p>
@@ -4184,7 +4196,7 @@
           <a:p>
             <a:fld id="{A3B60447-59FD-4F5A-802E-A12DF6F2A149}" type="datetimeFigureOut">
               <a:rPr lang="en-US" smtClean="0"/>
-              <a:t>6/1/2025</a:t>
+              <a:t>6/11/2025</a:t>
             </a:fld>
             <a:endParaRPr lang="en-US"/>
           </a:p>
@@ -4431,7 +4443,7 @@
           <a:p>
             <a:fld id="{A3B60447-59FD-4F5A-802E-A12DF6F2A149}" type="datetimeFigureOut">
               <a:rPr lang="en-US" smtClean="0"/>
-              <a:t>6/1/2025</a:t>
+              <a:t>6/11/2025</a:t>
             </a:fld>
             <a:endParaRPr lang="en-US"/>
           </a:p>
@@ -4663,7 +4675,7 @@
           <a:p>
             <a:fld id="{A3B60447-59FD-4F5A-802E-A12DF6F2A149}" type="datetimeFigureOut">
               <a:rPr lang="en-US" smtClean="0"/>
-              <a:t>6/1/2025</a:t>
+              <a:t>6/11/2025</a:t>
             </a:fld>
             <a:endParaRPr lang="en-US"/>
           </a:p>
@@ -5037,7 +5049,7 @@
           <a:p>
             <a:fld id="{A3B60447-59FD-4F5A-802E-A12DF6F2A149}" type="datetimeFigureOut">
               <a:rPr lang="en-US" smtClean="0"/>
-              <a:t>6/1/2025</a:t>
+              <a:t>6/11/2025</a:t>
             </a:fld>
             <a:endParaRPr lang="en-US"/>
           </a:p>
@@ -5160,7 +5172,7 @@
           <a:p>
             <a:fld id="{A3B60447-59FD-4F5A-802E-A12DF6F2A149}" type="datetimeFigureOut">
               <a:rPr lang="en-US" smtClean="0"/>
-              <a:t>6/1/2025</a:t>
+              <a:t>6/11/2025</a:t>
             </a:fld>
             <a:endParaRPr lang="en-US"/>
           </a:p>
@@ -5255,7 +5267,7 @@
           <a:p>
             <a:fld id="{A3B60447-59FD-4F5A-802E-A12DF6F2A149}" type="datetimeFigureOut">
               <a:rPr lang="en-US" smtClean="0"/>
-              <a:t>6/1/2025</a:t>
+              <a:t>6/11/2025</a:t>
             </a:fld>
             <a:endParaRPr lang="en-US"/>
           </a:p>
@@ -5510,7 +5522,7 @@
           <a:p>
             <a:fld id="{A3B60447-59FD-4F5A-802E-A12DF6F2A149}" type="datetimeFigureOut">
               <a:rPr lang="en-US" smtClean="0"/>
-              <a:t>6/1/2025</a:t>
+              <a:t>6/11/2025</a:t>
             </a:fld>
             <a:endParaRPr lang="en-US"/>
           </a:p>
@@ -5773,7 +5785,7 @@
           <a:p>
             <a:fld id="{A3B60447-59FD-4F5A-802E-A12DF6F2A149}" type="datetimeFigureOut">
               <a:rPr lang="en-US" smtClean="0"/>
-              <a:t>6/1/2025</a:t>
+              <a:t>6/11/2025</a:t>
             </a:fld>
             <a:endParaRPr lang="en-US"/>
           </a:p>
@@ -6516,7 +6528,7 @@
           <a:p>
             <a:fld id="{A3B60447-59FD-4F5A-802E-A12DF6F2A149}" type="datetimeFigureOut">
               <a:rPr lang="en-US" smtClean="0"/>
-              <a:t>6/1/2025</a:t>
+              <a:t>6/11/2025</a:t>
             </a:fld>
             <a:endParaRPr lang="en-US"/>
           </a:p>
@@ -7881,7 +7893,7 @@
           <p:cNvPr id="2" name="Title 1">
             <a:extLst>
               <a:ext uri="{FF2B5EF4-FFF2-40B4-BE49-F238E27FC236}">
-                <a16:creationId xmlns:a16="http://schemas.microsoft.com/office/drawing/2014/main" id="{ED2D2B6F-8BE2-4F1A-EA65-71E4938CF0C1}"/>
+                <a16:creationId xmlns:a16="http://schemas.microsoft.com/office/drawing/2014/main" id="{0ED21ADA-27F5-0BD9-733A-48F9C0C16BC0}"/>
               </a:ext>
             </a:extLst>
           </p:cNvPr>
@@ -7899,7 +7911,7 @@
           <a:p>
             <a:r>
               <a:rPr lang="en-US" dirty="0"/>
-              <a:t>Reflection + Attributes</a:t>
+              <a:t>Attributes</a:t>
             </a:r>
           </a:p>
         </p:txBody>
@@ -7909,7 +7921,7 @@
           <p:cNvPr id="3" name="Content Placeholder 2">
             <a:extLst>
               <a:ext uri="{FF2B5EF4-FFF2-40B4-BE49-F238E27FC236}">
-                <a16:creationId xmlns:a16="http://schemas.microsoft.com/office/drawing/2014/main" id="{6BF160C9-1B24-715A-B559-5294F76E2713}"/>
+                <a16:creationId xmlns:a16="http://schemas.microsoft.com/office/drawing/2014/main" id="{77386FB6-07CC-B2DE-CF0B-C0DA6121B4E8}"/>
               </a:ext>
             </a:extLst>
           </p:cNvPr>
@@ -7927,53 +7939,58 @@
           <a:p>
             <a:r>
               <a:rPr lang="en-US" dirty="0"/>
-              <a:t>When setting attributes, we are expecting some kind of reflection to read them and do something about them</a:t>
-            </a:r>
-          </a:p>
-          <a:p>
+              <a:t>[XXX] before class/methods/parameters definition</a:t>
+            </a:r>
+          </a:p>
+          <a:p>
+            <a:r>
+              <a:rPr lang="en-US" dirty="0"/>
+              <a:t>Provide Metadata to that entity</a:t>
+            </a:r>
+          </a:p>
+          <a:p>
+            <a:pPr lvl="1"/>
+            <a:r>
+              <a:rPr lang="en-US" dirty="0"/>
+              <a:t>[Fact] – for testing</a:t>
+            </a:r>
+          </a:p>
+          <a:p>
+            <a:pPr lvl="1"/>
+            <a:r>
+              <a:rPr lang="en-US" dirty="0"/>
+              <a:t>[Obsolete] – for marking a function as obsolete</a:t>
+            </a:r>
+          </a:p>
+          <a:p>
+            <a:r>
+              <a:rPr lang="en-US" dirty="0"/>
+              <a:t>They don’t DO anything, but only provide Metadata</a:t>
+            </a:r>
+          </a:p>
+          <a:p>
+            <a:r>
+              <a:rPr lang="en-US" dirty="0"/>
+              <a:t>Other function might do something with it (like </a:t>
+            </a:r>
             <a:r>
               <a:rPr lang="en-US" dirty="0" err="1"/>
               <a:t>xUnit</a:t>
             </a:r>
             <a:r>
               <a:rPr lang="en-US" dirty="0"/>
-              <a:t> and [Fact] – We saw</a:t>
-            </a:r>
-          </a:p>
-          <a:p>
-            <a:r>
-              <a:rPr lang="en-US" dirty="0"/>
-              <a:t>DI and [</a:t>
-            </a:r>
-            <a:r>
-              <a:rPr lang="en-US" dirty="0" err="1"/>
-              <a:t>ApiController</a:t>
-            </a:r>
-            <a:r>
-              <a:rPr lang="en-US" dirty="0"/>
-              <a:t>] – Now we’ll see</a:t>
-            </a:r>
-          </a:p>
-          <a:p>
-            <a:r>
-              <a:rPr lang="en-US" dirty="0"/>
-              <a:t>Json and [</a:t>
-            </a:r>
-            <a:r>
-              <a:rPr lang="en-US" dirty="0" err="1"/>
-              <a:t>JsonProperty</a:t>
-            </a:r>
-            <a:r>
-              <a:rPr lang="en-US" dirty="0"/>
-              <a:t>] – Later we’ll see</a:t>
-            </a:r>
+              <a:t> and [Fact])</a:t>
+            </a:r>
+          </a:p>
+          <a:p>
+            <a:endParaRPr lang="en-US" dirty="0"/>
           </a:p>
         </p:txBody>
       </p:sp>
     </p:spTree>
     <p:extLst>
       <p:ext uri="{BB962C8B-B14F-4D97-AF65-F5344CB8AC3E}">
-        <p14:creationId xmlns:p14="http://schemas.microsoft.com/office/powerpoint/2010/main" val="650507517"/>
+        <p14:creationId xmlns:p14="http://schemas.microsoft.com/office/powerpoint/2010/main" val="3190178724"/>
       </p:ext>
     </p:extLst>
   </p:cSld>
@@ -7988,13 +8005,7 @@
   <p:cSld>
     <p:spTree>
       <p:nvGrpSpPr>
-        <p:cNvPr id="1" name="">
-          <a:extLst>
-            <a:ext uri="{FF2B5EF4-FFF2-40B4-BE49-F238E27FC236}">
-              <a16:creationId xmlns:a16="http://schemas.microsoft.com/office/drawing/2014/main" id="{A18C7001-5F2D-9089-7EE3-B993281A1D87}"/>
-            </a:ext>
-          </a:extLst>
-        </p:cNvPr>
+        <p:cNvPr id="1" name=""/>
         <p:cNvGrpSpPr/>
         <p:nvPr/>
       </p:nvGrpSpPr>
@@ -8008,10 +8019,10 @@
       </p:grpSpPr>
       <p:sp>
         <p:nvSpPr>
-          <p:cNvPr id="4" name="Title 3">
+          <p:cNvPr id="2" name="Title 1">
             <a:extLst>
               <a:ext uri="{FF2B5EF4-FFF2-40B4-BE49-F238E27FC236}">
-                <a16:creationId xmlns:a16="http://schemas.microsoft.com/office/drawing/2014/main" id="{D58C96DB-6029-42BA-D091-E3B65A7C33FB}"/>
+                <a16:creationId xmlns:a16="http://schemas.microsoft.com/office/drawing/2014/main" id="{6EBEA1BB-5A48-4BE3-7C5A-264E8C4CC593}"/>
               </a:ext>
             </a:extLst>
           </p:cNvPr>
@@ -8019,33 +8030,27 @@
             <a:spLocks noGrp="1"/>
           </p:cNvSpPr>
           <p:nvPr>
-            <p:ph type="ctrTitle"/>
-          </p:nvPr>
-        </p:nvSpPr>
-        <p:spPr>
-          <a:xfrm>
-            <a:off x="1089329" y="2404534"/>
-            <a:ext cx="8602412" cy="1646302"/>
-          </a:xfrm>
-        </p:spPr>
+            <p:ph type="title"/>
+          </p:nvPr>
+        </p:nvSpPr>
+        <p:spPr/>
         <p:txBody>
           <a:bodyPr/>
           <a:lstStyle/>
           <a:p>
-            <a:pPr algn="ctr"/>
-            <a:r>
-              <a:rPr lang="en-US" dirty="0"/>
-              <a:t>LET’S SEE THIS IN ACTION</a:t>
-            </a:r>
-          </a:p>
-        </p:txBody>
-      </p:sp>
-      <p:sp>
-        <p:nvSpPr>
-          <p:cNvPr id="5" name="Subtitle 4">
+            <a:r>
+              <a:rPr lang="en-US" dirty="0"/>
+              <a:t>Reflection</a:t>
+            </a:r>
+          </a:p>
+        </p:txBody>
+      </p:sp>
+      <p:sp>
+        <p:nvSpPr>
+          <p:cNvPr id="3" name="Content Placeholder 2">
             <a:extLst>
               <a:ext uri="{FF2B5EF4-FFF2-40B4-BE49-F238E27FC236}">
-                <a16:creationId xmlns:a16="http://schemas.microsoft.com/office/drawing/2014/main" id="{E799F13C-7297-3AB5-C20F-396F43D020CB}"/>
+                <a16:creationId xmlns:a16="http://schemas.microsoft.com/office/drawing/2014/main" id="{F2AC46CC-057C-1591-1D62-48208B58D727}"/>
               </a:ext>
             </a:extLst>
           </p:cNvPr>
@@ -8053,7 +8058,7 @@
             <a:spLocks noGrp="1"/>
           </p:cNvSpPr>
           <p:nvPr>
-            <p:ph type="subTitle" idx="1"/>
+            <p:ph idx="1"/>
           </p:nvPr>
         </p:nvSpPr>
         <p:spPr/>
@@ -8061,14 +8066,36 @@
           <a:bodyPr/>
           <a:lstStyle/>
           <a:p>
-            <a:endParaRPr lang="en-US" dirty="0"/>
+            <a:r>
+              <a:rPr lang="en-US" dirty="0"/>
+              <a:t>Look at entities Metadata while running</a:t>
+            </a:r>
+          </a:p>
+          <a:p>
+            <a:r>
+              <a:rPr lang="en-US" dirty="0"/>
+              <a:t>A way to find classes, methods and create or invoke them</a:t>
+            </a:r>
+          </a:p>
+          <a:p>
+            <a:pPr lvl="1"/>
+            <a:r>
+              <a:rPr lang="en-US" dirty="0"/>
+              <a:t>Yes, private functions as well!</a:t>
+            </a:r>
+          </a:p>
+          <a:p>
+            <a:r>
+              <a:rPr lang="en-US" dirty="0"/>
+              <a:t>You must have a very good reason to do this!</a:t>
+            </a:r>
           </a:p>
         </p:txBody>
       </p:sp>
     </p:spTree>
     <p:extLst>
       <p:ext uri="{BB962C8B-B14F-4D97-AF65-F5344CB8AC3E}">
-        <p14:creationId xmlns:p14="http://schemas.microsoft.com/office/powerpoint/2010/main" val="2312485534"/>
+        <p14:creationId xmlns:p14="http://schemas.microsoft.com/office/powerpoint/2010/main" val="2396658276"/>
       </p:ext>
     </p:extLst>
   </p:cSld>
@@ -8097,10 +8124,10 @@
       </p:grpSpPr>
       <p:sp>
         <p:nvSpPr>
-          <p:cNvPr id="4" name="Title 3">
+          <p:cNvPr id="2" name="Title 1">
             <a:extLst>
               <a:ext uri="{FF2B5EF4-FFF2-40B4-BE49-F238E27FC236}">
-                <a16:creationId xmlns:a16="http://schemas.microsoft.com/office/drawing/2014/main" id="{295825D5-F96E-B752-3ECD-01DFBFBF8D9E}"/>
+                <a16:creationId xmlns:a16="http://schemas.microsoft.com/office/drawing/2014/main" id="{ED2D2B6F-8BE2-4F1A-EA65-71E4938CF0C1}"/>
               </a:ext>
             </a:extLst>
           </p:cNvPr>
@@ -8108,7 +8135,7 @@
             <a:spLocks noGrp="1"/>
           </p:cNvSpPr>
           <p:nvPr>
-            <p:ph type="ctrTitle"/>
+            <p:ph type="title"/>
           </p:nvPr>
         </p:nvSpPr>
         <p:spPr/>
@@ -8118,17 +8145,17 @@
           <a:p>
             <a:r>
               <a:rPr lang="en-US" dirty="0"/>
-              <a:t>TODO List Web App!</a:t>
-            </a:r>
-          </a:p>
-        </p:txBody>
-      </p:sp>
-      <p:sp>
-        <p:nvSpPr>
-          <p:cNvPr id="5" name="Subtitle 4">
+              <a:t>Reflection + Attributes</a:t>
+            </a:r>
+          </a:p>
+        </p:txBody>
+      </p:sp>
+      <p:sp>
+        <p:nvSpPr>
+          <p:cNvPr id="3" name="Content Placeholder 2">
             <a:extLst>
               <a:ext uri="{FF2B5EF4-FFF2-40B4-BE49-F238E27FC236}">
-                <a16:creationId xmlns:a16="http://schemas.microsoft.com/office/drawing/2014/main" id="{9B2AFC18-96E6-AFA8-4AD1-D8F2A279A3FD}"/>
+                <a16:creationId xmlns:a16="http://schemas.microsoft.com/office/drawing/2014/main" id="{6BF160C9-1B24-715A-B559-5294F76E2713}"/>
               </a:ext>
             </a:extLst>
           </p:cNvPr>
@@ -8136,7 +8163,7 @@
             <a:spLocks noGrp="1"/>
           </p:cNvSpPr>
           <p:nvPr>
-            <p:ph type="subTitle" idx="1"/>
+            <p:ph idx="1"/>
           </p:nvPr>
         </p:nvSpPr>
         <p:spPr/>
@@ -8144,14 +8171,55 @@
           <a:bodyPr/>
           <a:lstStyle/>
           <a:p>
-            <a:endParaRPr lang="en-US"/>
+            <a:r>
+              <a:rPr lang="en-US" dirty="0"/>
+              <a:t>When setting attributes, we are expecting some kind of reflection to read them and do something about them</a:t>
+            </a:r>
+          </a:p>
+          <a:p>
+            <a:r>
+              <a:rPr lang="en-US" dirty="0" err="1"/>
+              <a:t>xUnit</a:t>
+            </a:r>
+            <a:r>
+              <a:rPr lang="en-US" dirty="0"/>
+              <a:t> and [Fact] – We saw</a:t>
+            </a:r>
+          </a:p>
+          <a:p>
+            <a:r>
+              <a:rPr lang="en-US" dirty="0"/>
+              <a:t>DI and [</a:t>
+            </a:r>
+            <a:r>
+              <a:rPr lang="en-US" dirty="0" err="1"/>
+              <a:t>ApiController</a:t>
+            </a:r>
+            <a:r>
+              <a:rPr lang="en-US" dirty="0"/>
+              <a:t>] – Now we’ll see</a:t>
+            </a:r>
+          </a:p>
+          <a:p>
+            <a:r>
+              <a:rPr lang="en-US" dirty="0"/>
+              <a:t>Json and [</a:t>
+            </a:r>
+            <a:r>
+              <a:rPr lang="en-US" dirty="0" err="1"/>
+              <a:t>JsonProperty</a:t>
+            </a:r>
+            <a:r>
+              <a:rPr lang="en-US" dirty="0"/>
+              <a:t>] – Later we’ll see</a:t>
+            </a:r>
           </a:p>
         </p:txBody>
       </p:sp>
     </p:spTree>
     <p:extLst>
       <p:ext uri="{BB962C8B-B14F-4D97-AF65-F5344CB8AC3E}">
-        <p14:creationId xmlns:p14="http://schemas.microsoft.com/office/powerpoint/2010/main" val="2262755025"/>
+        <p14:creationId xmlns:p14="http://schemas.microsoft.com/office/powerpoint/2010/main" val="650507517"/>
       </p:ext>
     </p:extLst>
   </p:cSld>
@@ -8166,7 +8234,13 @@
   <p:cSld>
     <p:spTree>
       <p:nvGrpSpPr>
-        <p:cNvPr id="1" name=""/>
+        <p:cNvPr id="1" name="">
+          <a:extLst>
+            <a:ext uri="{FF2B5EF4-FFF2-40B4-BE49-F238E27FC236}">
+              <a16:creationId xmlns:a16="http://schemas.microsoft.com/office/drawing/2014/main" id="{A18C7001-5F2D-9089-7EE3-B993281A1D87}"/>
+            </a:ext>
+          </a:extLst>
+        </p:cNvPr>
         <p:cNvGrpSpPr/>
         <p:nvPr/>
       </p:nvGrpSpPr>
@@ -8180,10 +8254,10 @@
       </p:grpSpPr>
       <p:sp>
         <p:nvSpPr>
-          <p:cNvPr id="2" name="Title 1">
+          <p:cNvPr id="4" name="Title 3">
             <a:extLst>
               <a:ext uri="{FF2B5EF4-FFF2-40B4-BE49-F238E27FC236}">
-                <a16:creationId xmlns:a16="http://schemas.microsoft.com/office/drawing/2014/main" id="{693CE83D-96D8-6BCD-80EB-66C2933F4CCD}"/>
+                <a16:creationId xmlns:a16="http://schemas.microsoft.com/office/drawing/2014/main" id="{D58C96DB-6029-42BA-D091-E3B65A7C33FB}"/>
               </a:ext>
             </a:extLst>
           </p:cNvPr>
@@ -8191,27 +8265,33 @@
             <a:spLocks noGrp="1"/>
           </p:cNvSpPr>
           <p:nvPr>
-            <p:ph type="title"/>
-          </p:nvPr>
-        </p:nvSpPr>
-        <p:spPr/>
+            <p:ph type="ctrTitle"/>
+          </p:nvPr>
+        </p:nvSpPr>
+        <p:spPr>
+          <a:xfrm>
+            <a:off x="1089329" y="2404534"/>
+            <a:ext cx="8602412" cy="1646302"/>
+          </a:xfrm>
+        </p:spPr>
         <p:txBody>
           <a:bodyPr/>
           <a:lstStyle/>
           <a:p>
-            <a:r>
-              <a:rPr lang="en-US" dirty="0"/>
-              <a:t>How to test?</a:t>
-            </a:r>
-          </a:p>
-        </p:txBody>
-      </p:sp>
-      <p:sp>
-        <p:nvSpPr>
-          <p:cNvPr id="3" name="Content Placeholder 2">
+            <a:pPr algn="ctr"/>
+            <a:r>
+              <a:rPr lang="en-US" dirty="0"/>
+              <a:t>LET’S SEE THIS IN ACTION</a:t>
+            </a:r>
+          </a:p>
+        </p:txBody>
+      </p:sp>
+      <p:sp>
+        <p:nvSpPr>
+          <p:cNvPr id="5" name="Subtitle 4">
             <a:extLst>
               <a:ext uri="{FF2B5EF4-FFF2-40B4-BE49-F238E27FC236}">
-                <a16:creationId xmlns:a16="http://schemas.microsoft.com/office/drawing/2014/main" id="{2CAD2459-9C0C-5ABB-3BC3-9B7040093834}"/>
+                <a16:creationId xmlns:a16="http://schemas.microsoft.com/office/drawing/2014/main" id="{E799F13C-7297-3AB5-C20F-396F43D020CB}"/>
               </a:ext>
             </a:extLst>
           </p:cNvPr>
@@ -8219,7 +8299,7 @@
             <a:spLocks noGrp="1"/>
           </p:cNvSpPr>
           <p:nvPr>
-            <p:ph idx="1"/>
+            <p:ph type="subTitle" idx="1"/>
           </p:nvPr>
         </p:nvSpPr>
         <p:spPr/>
@@ -8227,29 +8307,14 @@
           <a:bodyPr/>
           <a:lstStyle/>
           <a:p>
-            <a:r>
-              <a:rPr lang="en-US" dirty="0"/>
-              <a:t>We don’t do IO, right?</a:t>
-            </a:r>
-          </a:p>
-          <a:p>
-            <a:r>
-              <a:rPr lang="en-US" dirty="0"/>
-              <a:t>But we want to test our endpoints!</a:t>
-            </a:r>
-          </a:p>
-          <a:p>
-            <a:r>
-              <a:rPr lang="en-US" dirty="0"/>
-              <a:t>Microsoft to the rescue!</a:t>
-            </a:r>
+            <a:endParaRPr lang="en-US" dirty="0"/>
           </a:p>
         </p:txBody>
       </p:sp>
     </p:spTree>
     <p:extLst>
       <p:ext uri="{BB962C8B-B14F-4D97-AF65-F5344CB8AC3E}">
-        <p14:creationId xmlns:p14="http://schemas.microsoft.com/office/powerpoint/2010/main" val="3741149663"/>
+        <p14:creationId xmlns:p14="http://schemas.microsoft.com/office/powerpoint/2010/main" val="2312485534"/>
       </p:ext>
     </p:extLst>
   </p:cSld>
@@ -8281,7 +8346,7 @@
           <p:cNvPr id="4" name="Title 3">
             <a:extLst>
               <a:ext uri="{FF2B5EF4-FFF2-40B4-BE49-F238E27FC236}">
-                <a16:creationId xmlns:a16="http://schemas.microsoft.com/office/drawing/2014/main" id="{596F5E6F-5A7E-E8F3-DC4F-4C71B82DA47B}"/>
+                <a16:creationId xmlns:a16="http://schemas.microsoft.com/office/drawing/2014/main" id="{295825D5-F96E-B752-3ECD-01DFBFBF8D9E}"/>
               </a:ext>
             </a:extLst>
           </p:cNvPr>
@@ -8289,7 +8354,7 @@
             <a:spLocks noGrp="1"/>
           </p:cNvSpPr>
           <p:nvPr>
-            <p:ph type="title"/>
+            <p:ph type="ctrTitle"/>
           </p:nvPr>
         </p:nvSpPr>
         <p:spPr/>
@@ -8299,17 +8364,17 @@
           <a:p>
             <a:r>
               <a:rPr lang="en-US" dirty="0"/>
-              <a:t>What’s next?</a:t>
-            </a:r>
-          </a:p>
-        </p:txBody>
-      </p:sp>
-      <p:sp>
-        <p:nvSpPr>
-          <p:cNvPr id="6" name="Content Placeholder 5">
+              <a:t>TODO List Web App!</a:t>
+            </a:r>
+          </a:p>
+        </p:txBody>
+      </p:sp>
+      <p:sp>
+        <p:nvSpPr>
+          <p:cNvPr id="5" name="Subtitle 4">
             <a:extLst>
               <a:ext uri="{FF2B5EF4-FFF2-40B4-BE49-F238E27FC236}">
-                <a16:creationId xmlns:a16="http://schemas.microsoft.com/office/drawing/2014/main" id="{DFC6618F-F90D-6BB7-62CF-A24694D77DE9}"/>
+                <a16:creationId xmlns:a16="http://schemas.microsoft.com/office/drawing/2014/main" id="{9B2AFC18-96E6-AFA8-4AD1-D8F2A279A3FD}"/>
               </a:ext>
             </a:extLst>
           </p:cNvPr>
@@ -8317,7 +8382,7 @@
             <a:spLocks noGrp="1"/>
           </p:cNvSpPr>
           <p:nvPr>
-            <p:ph idx="1"/>
+            <p:ph type="subTitle" idx="1"/>
           </p:nvPr>
         </p:nvSpPr>
         <p:spPr/>
@@ -8325,48 +8390,14 @@
           <a:bodyPr/>
           <a:lstStyle/>
           <a:p>
-            <a:r>
-              <a:rPr lang="en-US" dirty="0"/>
-              <a:t>Create different types of tasks</a:t>
-            </a:r>
-          </a:p>
-          <a:p>
-            <a:r>
-              <a:rPr lang="en-US" dirty="0"/>
-              <a:t>Change the JSON representation of Id, Title and Description</a:t>
-            </a:r>
-          </a:p>
-          <a:p>
-            <a:r>
-              <a:rPr lang="en-US" dirty="0"/>
-              <a:t>Get – Add filter in request path (?</a:t>
-            </a:r>
-            <a:r>
-              <a:rPr lang="en-US" dirty="0" err="1"/>
-              <a:t>orderby</a:t>
-            </a:r>
-            <a:r>
-              <a:rPr lang="en-US" dirty="0"/>
-              <a:t>, ?</a:t>
-            </a:r>
-            <a:r>
-              <a:rPr lang="en-US" dirty="0" err="1"/>
-              <a:t>startswith</a:t>
-            </a:r>
-            <a:r>
-              <a:rPr lang="en-US" dirty="0"/>
-              <a:t>)</a:t>
-            </a:r>
-          </a:p>
-          <a:p>
-            <a:endParaRPr lang="en-US" dirty="0"/>
+            <a:endParaRPr lang="en-US"/>
           </a:p>
         </p:txBody>
       </p:sp>
     </p:spTree>
     <p:extLst>
       <p:ext uri="{BB962C8B-B14F-4D97-AF65-F5344CB8AC3E}">
-        <p14:creationId xmlns:p14="http://schemas.microsoft.com/office/powerpoint/2010/main" val="171343935"/>
+        <p14:creationId xmlns:p14="http://schemas.microsoft.com/office/powerpoint/2010/main" val="2262755025"/>
       </p:ext>
     </p:extLst>
   </p:cSld>
@@ -8398,7 +8429,7 @@
           <p:cNvPr id="2" name="Title 1">
             <a:extLst>
               <a:ext uri="{FF2B5EF4-FFF2-40B4-BE49-F238E27FC236}">
-                <a16:creationId xmlns:a16="http://schemas.microsoft.com/office/drawing/2014/main" id="{95050C92-C9F9-ABCB-5B1B-1A1305E115CF}"/>
+                <a16:creationId xmlns:a16="http://schemas.microsoft.com/office/drawing/2014/main" id="{B4E802D5-9925-DA2B-F5F9-9F8154FF49F6}"/>
               </a:ext>
             </a:extLst>
           </p:cNvPr>
@@ -8416,7 +8447,7 @@
           <a:p>
             <a:r>
               <a:rPr lang="en-US" dirty="0"/>
-              <a:t>If time allows</a:t>
+              <a:t>Client Side</a:t>
             </a:r>
           </a:p>
         </p:txBody>
@@ -8426,7 +8457,7 @@
           <p:cNvPr id="3" name="Content Placeholder 2">
             <a:extLst>
               <a:ext uri="{FF2B5EF4-FFF2-40B4-BE49-F238E27FC236}">
-                <a16:creationId xmlns:a16="http://schemas.microsoft.com/office/drawing/2014/main" id="{14ED181C-6BD7-1294-30A6-E461443770B6}"/>
+                <a16:creationId xmlns:a16="http://schemas.microsoft.com/office/drawing/2014/main" id="{71F64749-5813-51BE-8FED-82887472B612}"/>
               </a:ext>
             </a:extLst>
           </p:cNvPr>
@@ -8443,46 +8474,407 @@
           <a:lstStyle/>
           <a:p>
             <a:r>
+              <a:rPr lang="en-US" dirty="0"/>
+              <a:t>How to make requests?</a:t>
+            </a:r>
+          </a:p>
+          <a:p>
+            <a:r>
+              <a:rPr lang="en-US" dirty="0"/>
+              <a:t>We need to send Http requests to our server</a:t>
+            </a:r>
+          </a:p>
+          <a:p>
+            <a:r>
+              <a:rPr lang="en-US" dirty="0"/>
+              <a:t>Introducing: </a:t>
+            </a:r>
+            <a:r>
               <a:rPr lang="en-US" dirty="0" err="1"/>
-              <a:t>AppSettings</a:t>
-            </a:r>
-            <a:r>
-              <a:rPr lang="en-US" dirty="0"/>
-              <a:t> override</a:t>
-            </a:r>
-          </a:p>
-          <a:p>
-            <a:r>
-              <a:rPr lang="en-US" dirty="0" err="1"/>
-              <a:t>HttpClient</a:t>
-            </a:r>
-            <a:r>
-              <a:rPr lang="en-US" dirty="0"/>
-              <a:t> and </a:t>
-            </a:r>
-            <a:r>
-              <a:rPr lang="en-US" dirty="0" err="1"/>
-              <a:t>HttpClientFactory</a:t>
-            </a:r>
-            <a:r>
-              <a:rPr lang="en-US" dirty="0"/>
-              <a:t> (named client, </a:t>
-            </a:r>
-            <a:r>
-              <a:rPr lang="en-US" dirty="0" err="1"/>
-              <a:t>polly</a:t>
-            </a:r>
-            <a:r>
-              <a:rPr lang="en-US" dirty="0"/>
-              <a:t>)</a:t>
-            </a:r>
+              <a:t>IHttpClientFactory</a:t>
+            </a:r>
+            <a:endParaRPr lang="en-US" dirty="0"/>
           </a:p>
         </p:txBody>
       </p:sp>
     </p:spTree>
     <p:extLst>
       <p:ext uri="{BB962C8B-B14F-4D97-AF65-F5344CB8AC3E}">
-        <p14:creationId xmlns:p14="http://schemas.microsoft.com/office/powerpoint/2010/main" val="67798641"/>
+        <p14:creationId xmlns:p14="http://schemas.microsoft.com/office/powerpoint/2010/main" val="1153201509"/>
+      </p:ext>
+    </p:extLst>
+  </p:cSld>
+  <p:clrMapOvr>
+    <a:masterClrMapping/>
+  </p:clrMapOvr>
+</p:sld>
+</file>
+
+<file path=ppt/slides/slide16.xml><?xml version="1.0" encoding="utf-8"?>
+<p:sld xmlns:a="http://schemas.openxmlformats.org/drawingml/2006/main" xmlns:r="http://schemas.openxmlformats.org/officeDocument/2006/relationships" xmlns:p="http://schemas.openxmlformats.org/presentationml/2006/main">
+  <p:cSld>
+    <p:spTree>
+      <p:nvGrpSpPr>
+        <p:cNvPr id="1" name=""/>
+        <p:cNvGrpSpPr/>
+        <p:nvPr/>
+      </p:nvGrpSpPr>
+      <p:grpSpPr>
+        <a:xfrm>
+          <a:off x="0" y="0"/>
+          <a:ext cx="0" cy="0"/>
+          <a:chOff x="0" y="0"/>
+          <a:chExt cx="0" cy="0"/>
+        </a:xfrm>
+      </p:grpSpPr>
+      <p:sp>
+        <p:nvSpPr>
+          <p:cNvPr id="2" name="Title 1">
+            <a:extLst>
+              <a:ext uri="{FF2B5EF4-FFF2-40B4-BE49-F238E27FC236}">
+                <a16:creationId xmlns:a16="http://schemas.microsoft.com/office/drawing/2014/main" id="{B7EF86B1-ABFF-A9BB-22EC-0E94DDE5E977}"/>
+              </a:ext>
+            </a:extLst>
+          </p:cNvPr>
+          <p:cNvSpPr>
+            <a:spLocks noGrp="1"/>
+          </p:cNvSpPr>
+          <p:nvPr>
+            <p:ph type="title"/>
+          </p:nvPr>
+        </p:nvSpPr>
+        <p:spPr/>
+        <p:txBody>
+          <a:bodyPr/>
+          <a:lstStyle/>
+          <a:p>
+            <a:r>
+              <a:rPr lang="en-US" dirty="0" err="1"/>
+              <a:t>IHttpClientFactory</a:t>
+            </a:r>
+            <a:r>
+              <a:rPr lang="en-US" dirty="0"/>
+              <a:t> ❤️ </a:t>
+            </a:r>
+            <a:r>
+              <a:rPr lang="en-US" dirty="0" err="1"/>
+              <a:t>HttpClient</a:t>
+            </a:r>
+            <a:endParaRPr lang="en-US" dirty="0"/>
+          </a:p>
+        </p:txBody>
+      </p:sp>
+      <p:sp>
+        <p:nvSpPr>
+          <p:cNvPr id="3" name="Content Placeholder 2">
+            <a:extLst>
+              <a:ext uri="{FF2B5EF4-FFF2-40B4-BE49-F238E27FC236}">
+                <a16:creationId xmlns:a16="http://schemas.microsoft.com/office/drawing/2014/main" id="{3DD7B7DE-9FED-41B4-E031-A45400DB44E4}"/>
+              </a:ext>
+            </a:extLst>
+          </p:cNvPr>
+          <p:cNvSpPr>
+            <a:spLocks noGrp="1"/>
+          </p:cNvSpPr>
+          <p:nvPr>
+            <p:ph idx="1"/>
+          </p:nvPr>
+        </p:nvSpPr>
+        <p:spPr/>
+        <p:txBody>
+          <a:bodyPr/>
+          <a:lstStyle/>
+          <a:p>
+            <a:r>
+              <a:rPr lang="en-US" dirty="0"/>
+              <a:t>Receive </a:t>
+            </a:r>
+            <a:r>
+              <a:rPr lang="en-US" dirty="0" err="1"/>
+              <a:t>IHttpClientFactory</a:t>
+            </a:r>
+            <a:r>
+              <a:rPr lang="en-US" dirty="0"/>
+              <a:t> in the constructor</a:t>
+            </a:r>
+          </a:p>
+          <a:p>
+            <a:r>
+              <a:rPr lang="en-US" dirty="0"/>
+              <a:t>Use </a:t>
+            </a:r>
+            <a:r>
+              <a:rPr lang="en-US" dirty="0" err="1"/>
+              <a:t>httpClientFactory.CreateClient</a:t>
+            </a:r>
+            <a:r>
+              <a:rPr lang="en-US" dirty="0"/>
+              <a:t>() to receive the </a:t>
+            </a:r>
+            <a:r>
+              <a:rPr lang="en-US" dirty="0" err="1"/>
+              <a:t>HttpClient</a:t>
+            </a:r>
+            <a:r>
+              <a:rPr lang="en-US" dirty="0"/>
+              <a:t> instance</a:t>
+            </a:r>
+          </a:p>
+          <a:p>
+            <a:r>
+              <a:rPr lang="en-US" dirty="0"/>
+              <a:t>Use “using” when sending a Http Request</a:t>
+            </a:r>
+          </a:p>
+          <a:p>
+            <a:r>
+              <a:rPr lang="en-US" dirty="0"/>
+              <a:t>Use </a:t>
+            </a:r>
+            <a:r>
+              <a:rPr lang="en-US" dirty="0" err="1"/>
+              <a:t>PostAsJsonAsync</a:t>
+            </a:r>
+            <a:r>
+              <a:rPr lang="en-US" dirty="0"/>
+              <a:t>(“”, &lt;object&gt;)</a:t>
+            </a:r>
+          </a:p>
+          <a:p>
+            <a:r>
+              <a:rPr lang="en-US" dirty="0"/>
+              <a:t>Use </a:t>
+            </a:r>
+            <a:r>
+              <a:rPr lang="en-US" dirty="0" err="1"/>
+              <a:t>ReadFromJsonAsync</a:t>
+            </a:r>
+            <a:r>
+              <a:rPr lang="en-US" dirty="0"/>
+              <a:t>&lt;object&gt;()</a:t>
+            </a:r>
+          </a:p>
+        </p:txBody>
+      </p:sp>
+    </p:spTree>
+    <p:extLst>
+      <p:ext uri="{BB962C8B-B14F-4D97-AF65-F5344CB8AC3E}">
+        <p14:creationId xmlns:p14="http://schemas.microsoft.com/office/powerpoint/2010/main" val="3168628156"/>
+      </p:ext>
+    </p:extLst>
+  </p:cSld>
+  <p:clrMapOvr>
+    <a:masterClrMapping/>
+  </p:clrMapOvr>
+</p:sld>
+</file>
+
+<file path=ppt/slides/slide17.xml><?xml version="1.0" encoding="utf-8"?>
+<p:sld xmlns:a="http://schemas.openxmlformats.org/drawingml/2006/main" xmlns:r="http://schemas.openxmlformats.org/officeDocument/2006/relationships" xmlns:p="http://schemas.openxmlformats.org/presentationml/2006/main">
+  <p:cSld>
+    <p:spTree>
+      <p:nvGrpSpPr>
+        <p:cNvPr id="1" name=""/>
+        <p:cNvGrpSpPr/>
+        <p:nvPr/>
+      </p:nvGrpSpPr>
+      <p:grpSpPr>
+        <a:xfrm>
+          <a:off x="0" y="0"/>
+          <a:ext cx="0" cy="0"/>
+          <a:chOff x="0" y="0"/>
+          <a:chExt cx="0" cy="0"/>
+        </a:xfrm>
+      </p:grpSpPr>
+      <p:sp>
+        <p:nvSpPr>
+          <p:cNvPr id="2" name="Title 1">
+            <a:extLst>
+              <a:ext uri="{FF2B5EF4-FFF2-40B4-BE49-F238E27FC236}">
+                <a16:creationId xmlns:a16="http://schemas.microsoft.com/office/drawing/2014/main" id="{693CE83D-96D8-6BCD-80EB-66C2933F4CCD}"/>
+              </a:ext>
+            </a:extLst>
+          </p:cNvPr>
+          <p:cNvSpPr>
+            <a:spLocks noGrp="1"/>
+          </p:cNvSpPr>
+          <p:nvPr>
+            <p:ph type="title"/>
+          </p:nvPr>
+        </p:nvSpPr>
+        <p:spPr/>
+        <p:txBody>
+          <a:bodyPr/>
+          <a:lstStyle/>
+          <a:p>
+            <a:r>
+              <a:rPr lang="en-US" dirty="0"/>
+              <a:t>How to test?</a:t>
+            </a:r>
+          </a:p>
+        </p:txBody>
+      </p:sp>
+      <p:sp>
+        <p:nvSpPr>
+          <p:cNvPr id="3" name="Content Placeholder 2">
+            <a:extLst>
+              <a:ext uri="{FF2B5EF4-FFF2-40B4-BE49-F238E27FC236}">
+                <a16:creationId xmlns:a16="http://schemas.microsoft.com/office/drawing/2014/main" id="{2CAD2459-9C0C-5ABB-3BC3-9B7040093834}"/>
+              </a:ext>
+            </a:extLst>
+          </p:cNvPr>
+          <p:cNvSpPr>
+            <a:spLocks noGrp="1"/>
+          </p:cNvSpPr>
+          <p:nvPr>
+            <p:ph idx="1"/>
+          </p:nvPr>
+        </p:nvSpPr>
+        <p:spPr/>
+        <p:txBody>
+          <a:bodyPr/>
+          <a:lstStyle/>
+          <a:p>
+            <a:r>
+              <a:rPr lang="en-US" dirty="0"/>
+              <a:t>We don’t do IO, right?</a:t>
+            </a:r>
+          </a:p>
+          <a:p>
+            <a:r>
+              <a:rPr lang="en-US" dirty="0"/>
+              <a:t>But we want to test our endpoints!</a:t>
+            </a:r>
+          </a:p>
+          <a:p>
+            <a:r>
+              <a:rPr lang="en-US" dirty="0"/>
+              <a:t>Microsoft to the rescue!</a:t>
+            </a:r>
+          </a:p>
+        </p:txBody>
+      </p:sp>
+    </p:spTree>
+    <p:extLst>
+      <p:ext uri="{BB962C8B-B14F-4D97-AF65-F5344CB8AC3E}">
+        <p14:creationId xmlns:p14="http://schemas.microsoft.com/office/powerpoint/2010/main" val="3741149663"/>
+      </p:ext>
+    </p:extLst>
+  </p:cSld>
+  <p:clrMapOvr>
+    <a:masterClrMapping/>
+  </p:clrMapOvr>
+</p:sld>
+</file>
+
+<file path=ppt/slides/slide18.xml><?xml version="1.0" encoding="utf-8"?>
+<p:sld xmlns:a="http://schemas.openxmlformats.org/drawingml/2006/main" xmlns:r="http://schemas.openxmlformats.org/officeDocument/2006/relationships" xmlns:p="http://schemas.openxmlformats.org/presentationml/2006/main">
+  <p:cSld>
+    <p:spTree>
+      <p:nvGrpSpPr>
+        <p:cNvPr id="1" name=""/>
+        <p:cNvGrpSpPr/>
+        <p:nvPr/>
+      </p:nvGrpSpPr>
+      <p:grpSpPr>
+        <a:xfrm>
+          <a:off x="0" y="0"/>
+          <a:ext cx="0" cy="0"/>
+          <a:chOff x="0" y="0"/>
+          <a:chExt cx="0" cy="0"/>
+        </a:xfrm>
+      </p:grpSpPr>
+      <p:sp>
+        <p:nvSpPr>
+          <p:cNvPr id="4" name="Title 3">
+            <a:extLst>
+              <a:ext uri="{FF2B5EF4-FFF2-40B4-BE49-F238E27FC236}">
+                <a16:creationId xmlns:a16="http://schemas.microsoft.com/office/drawing/2014/main" id="{596F5E6F-5A7E-E8F3-DC4F-4C71B82DA47B}"/>
+              </a:ext>
+            </a:extLst>
+          </p:cNvPr>
+          <p:cNvSpPr>
+            <a:spLocks noGrp="1"/>
+          </p:cNvSpPr>
+          <p:nvPr>
+            <p:ph type="title"/>
+          </p:nvPr>
+        </p:nvSpPr>
+        <p:spPr/>
+        <p:txBody>
+          <a:bodyPr/>
+          <a:lstStyle/>
+          <a:p>
+            <a:r>
+              <a:rPr lang="en-US" dirty="0"/>
+              <a:t>What’s next?</a:t>
+            </a:r>
+          </a:p>
+        </p:txBody>
+      </p:sp>
+      <p:sp>
+        <p:nvSpPr>
+          <p:cNvPr id="6" name="Content Placeholder 5">
+            <a:extLst>
+              <a:ext uri="{FF2B5EF4-FFF2-40B4-BE49-F238E27FC236}">
+                <a16:creationId xmlns:a16="http://schemas.microsoft.com/office/drawing/2014/main" id="{DFC6618F-F90D-6BB7-62CF-A24694D77DE9}"/>
+              </a:ext>
+            </a:extLst>
+          </p:cNvPr>
+          <p:cNvSpPr>
+            <a:spLocks noGrp="1"/>
+          </p:cNvSpPr>
+          <p:nvPr>
+            <p:ph idx="1"/>
+          </p:nvPr>
+        </p:nvSpPr>
+        <p:spPr/>
+        <p:txBody>
+          <a:bodyPr/>
+          <a:lstStyle/>
+          <a:p>
+            <a:r>
+              <a:rPr lang="en-US" dirty="0"/>
+              <a:t>Create different types of tasks</a:t>
+            </a:r>
+          </a:p>
+          <a:p>
+            <a:r>
+              <a:rPr lang="en-US" dirty="0"/>
+              <a:t>Change the JSON representation of Id, Title and Description</a:t>
+            </a:r>
+          </a:p>
+          <a:p>
+            <a:r>
+              <a:rPr lang="en-US" dirty="0"/>
+              <a:t>Get – Add filter in request path (?</a:t>
+            </a:r>
+            <a:r>
+              <a:rPr lang="en-US" dirty="0" err="1"/>
+              <a:t>orderby</a:t>
+            </a:r>
+            <a:r>
+              <a:rPr lang="en-US" dirty="0"/>
+              <a:t>, ?</a:t>
+            </a:r>
+            <a:r>
+              <a:rPr lang="en-US" dirty="0" err="1"/>
+              <a:t>startswith</a:t>
+            </a:r>
+            <a:r>
+              <a:rPr lang="en-US" dirty="0"/>
+              <a:t>)</a:t>
+            </a:r>
+          </a:p>
+          <a:p>
+            <a:endParaRPr lang="en-US" dirty="0"/>
+          </a:p>
+        </p:txBody>
+      </p:sp>
+    </p:spTree>
+    <p:extLst>
+      <p:ext uri="{BB962C8B-B14F-4D97-AF65-F5344CB8AC3E}">
+        <p14:creationId xmlns:p14="http://schemas.microsoft.com/office/powerpoint/2010/main" val="171343935"/>
       </p:ext>
     </p:extLst>
   </p:cSld>
@@ -8514,7 +8906,7 @@
           <p:cNvPr id="2" name="Title 1">
             <a:extLst>
               <a:ext uri="{FF2B5EF4-FFF2-40B4-BE49-F238E27FC236}">
-                <a16:creationId xmlns:a16="http://schemas.microsoft.com/office/drawing/2014/main" id="{A0FB8235-66BE-182E-F931-9758C6BB5A77}"/>
+                <a16:creationId xmlns:a16="http://schemas.microsoft.com/office/drawing/2014/main" id="{60DF9B80-7C0F-D349-E953-65029FBDFE82}"/>
               </a:ext>
             </a:extLst>
           </p:cNvPr>
@@ -8532,7 +8924,7 @@
           <a:p>
             <a:r>
               <a:rPr lang="en-US" dirty="0"/>
-              <a:t>JSON</a:t>
+              <a:t>Dependency Injection - Summary</a:t>
             </a:r>
           </a:p>
         </p:txBody>
@@ -8542,7 +8934,7 @@
           <p:cNvPr id="3" name="Content Placeholder 2">
             <a:extLst>
               <a:ext uri="{FF2B5EF4-FFF2-40B4-BE49-F238E27FC236}">
-                <a16:creationId xmlns:a16="http://schemas.microsoft.com/office/drawing/2014/main" id="{2251D7E3-5B4D-A1CD-3D4E-6C735044D01B}"/>
+                <a16:creationId xmlns:a16="http://schemas.microsoft.com/office/drawing/2014/main" id="{1A795153-F504-A2E7-40E2-4A97F848B903}"/>
               </a:ext>
             </a:extLst>
           </p:cNvPr>
@@ -8559,36 +8951,42 @@
           <a:lstStyle/>
           <a:p>
             <a:r>
-              <a:rPr lang="en-US" dirty="0" err="1"/>
-              <a:t>Javascript</a:t>
-            </a:r>
-            <a:r>
-              <a:rPr lang="en-US" dirty="0"/>
-              <a:t> Object Notation</a:t>
-            </a:r>
-          </a:p>
-          <a:p>
-            <a:r>
-              <a:rPr lang="en-US" dirty="0"/>
-              <a:t>A textual representation of an object</a:t>
-            </a:r>
-          </a:p>
-          <a:p>
-            <a:r>
-              <a:rPr lang="en-US" dirty="0"/>
-              <a:t>Used to pass data between entities through the internet</a:t>
-            </a:r>
-          </a:p>
-          <a:p>
-            <a:r>
-              <a:rPr lang="en-US" dirty="0"/>
-              <a:t>We’ll use it to receive and send data about our TODO items</a:t>
-            </a:r>
-          </a:p>
-          <a:p>
-            <a:r>
-              <a:rPr lang="en-US" dirty="0"/>
-              <a:t>It’s up to the “Client” to decide how it displays it</a:t>
+              <a:rPr lang="en-US" dirty="0"/>
+              <a:t>A design pattern where dependencies are provided to a class, rather than the class creating them</a:t>
+            </a:r>
+          </a:p>
+          <a:p>
+            <a:r>
+              <a:rPr lang="en-US" dirty="0"/>
+              <a:t>Code is now more modular, testable and maintainable</a:t>
+            </a:r>
+          </a:p>
+          <a:p>
+            <a:pPr lvl="1"/>
+            <a:r>
+              <a:rPr lang="en-US" dirty="0"/>
+              <a:t>Loose coupling</a:t>
+            </a:r>
+          </a:p>
+          <a:p>
+            <a:pPr lvl="1"/>
+            <a:r>
+              <a:rPr lang="en-US" dirty="0"/>
+              <a:t>Easier testing</a:t>
+            </a:r>
+          </a:p>
+          <a:p>
+            <a:pPr lvl="1"/>
+            <a:r>
+              <a:rPr lang="en-US" dirty="0"/>
+              <a:t>Single responsibility</a:t>
+            </a:r>
+          </a:p>
+          <a:p>
+            <a:pPr lvl="1"/>
+            <a:r>
+              <a:rPr lang="en-US" dirty="0"/>
+              <a:t>Lifecycle management</a:t>
             </a:r>
           </a:p>
         </p:txBody>
@@ -8596,7 +8994,7 @@
     </p:spTree>
     <p:extLst>
       <p:ext uri="{BB962C8B-B14F-4D97-AF65-F5344CB8AC3E}">
-        <p14:creationId xmlns:p14="http://schemas.microsoft.com/office/powerpoint/2010/main" val="1685312732"/>
+        <p14:creationId xmlns:p14="http://schemas.microsoft.com/office/powerpoint/2010/main" val="909017082"/>
       </p:ext>
     </p:extLst>
   </p:cSld>
@@ -8609,14 +9007,6 @@
 <file path=ppt/slides/slide3.xml><?xml version="1.0" encoding="utf-8"?>
 <p:sld xmlns:a="http://schemas.openxmlformats.org/drawingml/2006/main" xmlns:r="http://schemas.openxmlformats.org/officeDocument/2006/relationships" xmlns:p="http://schemas.openxmlformats.org/presentationml/2006/main">
   <p:cSld>
-    <p:bg>
-      <p:bgPr>
-        <a:solidFill>
-          <a:schemeClr val="bg1"/>
-        </a:solidFill>
-        <a:effectLst/>
-      </p:bgPr>
-    </p:bg>
     <p:spTree>
       <p:nvGrpSpPr>
         <p:cNvPr id="1" name=""/>
@@ -8631,149 +9021,87 @@
           <a:chExt cx="0" cy="0"/>
         </a:xfrm>
       </p:grpSpPr>
-      <p:cxnSp>
-        <p:nvCxnSpPr>
-          <p:cNvPr id="8" name="Straight Connector 7">
+      <p:sp>
+        <p:nvSpPr>
+          <p:cNvPr id="2" name="Title 1">
             <a:extLst>
               <a:ext uri="{FF2B5EF4-FFF2-40B4-BE49-F238E27FC236}">
-                <a16:creationId xmlns:a16="http://schemas.microsoft.com/office/drawing/2014/main" id="{0B5F7E3B-C5F1-40E0-A491-558BAFBC1127}"/>
-              </a:ext>
-              <a:ext uri="{C183D7F6-B498-43B3-948B-1728B52AA6E4}">
-                <adec:decorative xmlns:adec="http://schemas.microsoft.com/office/drawing/2017/decorative" val="1"/>
+                <a16:creationId xmlns:a16="http://schemas.microsoft.com/office/drawing/2014/main" id="{7B272F09-D754-C5C5-8A81-EE11CBD04A0F}"/>
               </a:ext>
             </a:extLst>
           </p:cNvPr>
-          <p:cNvCxnSpPr>
-            <a:cxnSpLocks noGrp="1" noRot="1" noChangeAspect="1" noMove="1" noResize="1" noEditPoints="1" noAdjustHandles="1" noChangeArrowheads="1" noChangeShapeType="1"/>
-          </p:cNvCxnSpPr>
-          <p:nvPr>
-            <p:extLst>
-              <p:ext uri="{386F3935-93C4-4BCD-93E2-E3B085C9AB24}">
-                <p16:designElem xmlns:p16="http://schemas.microsoft.com/office/powerpoint/2015/main" val="1"/>
-              </p:ext>
-            </p:extLst>
-          </p:nvPr>
-        </p:nvCxnSpPr>
-        <p:spPr>
-          <a:xfrm>
-            <a:off x="4241804" y="1460500"/>
-            <a:ext cx="0" cy="3937000"/>
-          </a:xfrm>
-          <a:prstGeom prst="line">
-            <a:avLst/>
-          </a:prstGeom>
-        </p:spPr>
-        <p:style>
-          <a:lnRef idx="1">
-            <a:schemeClr val="accent1"/>
-          </a:lnRef>
-          <a:fillRef idx="0">
-            <a:schemeClr val="accent1"/>
-          </a:fillRef>
-          <a:effectRef idx="0">
-            <a:schemeClr val="accent1"/>
-          </a:effectRef>
-          <a:fontRef idx="minor">
-            <a:schemeClr val="tx1"/>
-          </a:fontRef>
-        </p:style>
-      </p:cxnSp>
-      <p:sp>
-        <p:nvSpPr>
-          <p:cNvPr id="2" name="Title 1">
+          <p:cNvSpPr>
+            <a:spLocks noGrp="1"/>
+          </p:cNvSpPr>
+          <p:nvPr>
+            <p:ph type="title"/>
+          </p:nvPr>
+        </p:nvSpPr>
+        <p:spPr/>
+        <p:txBody>
+          <a:bodyPr/>
+          <a:lstStyle/>
+          <a:p>
+            <a:r>
+              <a:rPr lang="en-US" dirty="0"/>
+              <a:t>Dependency Injection</a:t>
+            </a:r>
+          </a:p>
+        </p:txBody>
+      </p:sp>
+      <p:pic>
+        <p:nvPicPr>
+          <p:cNvPr id="1026" name="Picture 2" descr="Comparing a traditional component with another its dependencies injected. Source: Aasenden 2015.">
             <a:extLst>
               <a:ext uri="{FF2B5EF4-FFF2-40B4-BE49-F238E27FC236}">
-                <a16:creationId xmlns:a16="http://schemas.microsoft.com/office/drawing/2014/main" id="{82467D4D-0B05-6CD8-8804-D2067424D4F2}"/>
+                <a16:creationId xmlns:a16="http://schemas.microsoft.com/office/drawing/2014/main" id="{EA2883D5-0222-B805-1562-BE4F513484D8}"/>
               </a:ext>
             </a:extLst>
           </p:cNvPr>
-          <p:cNvSpPr>
-            <a:spLocks noGrp="1"/>
-          </p:cNvSpPr>
-          <p:nvPr>
-            <p:ph type="title"/>
-          </p:nvPr>
-        </p:nvSpPr>
-        <p:spPr>
-          <a:xfrm>
-            <a:off x="643467" y="816638"/>
-            <a:ext cx="3367359" cy="5224724"/>
-          </a:xfrm>
-        </p:spPr>
-        <p:txBody>
-          <a:bodyPr anchor="ctr">
-            <a:normAutofit/>
-          </a:bodyPr>
-          <a:lstStyle/>
-          <a:p>
-            <a:r>
-              <a:rPr lang="en-US" dirty="0"/>
-              <a:t>HTTP Standards – Requests </a:t>
-            </a:r>
-          </a:p>
-        </p:txBody>
-      </p:sp>
-      <p:sp>
-        <p:nvSpPr>
-          <p:cNvPr id="3" name="Content Placeholder 2">
+          <p:cNvPicPr>
+            <a:picLocks noGrp="1" noChangeAspect="1" noChangeArrowheads="1"/>
+          </p:cNvPicPr>
+          <p:nvPr>
+            <p:ph idx="1"/>
+          </p:nvPr>
+        </p:nvPicPr>
+        <p:blipFill>
+          <a:blip r:embed="rId2">
             <a:extLst>
-              <a:ext uri="{FF2B5EF4-FFF2-40B4-BE49-F238E27FC236}">
-                <a16:creationId xmlns:a16="http://schemas.microsoft.com/office/drawing/2014/main" id="{4BC7D8F3-2B06-8B9A-AE4B-4082ADFB44DC}"/>
+              <a:ext uri="{28A0092B-C50C-407E-A947-70E740481C1C}">
+                <a14:useLocalDpi xmlns:a14="http://schemas.microsoft.com/office/drawing/2010/main" val="0"/>
               </a:ext>
             </a:extLst>
-          </p:cNvPr>
-          <p:cNvSpPr>
-            <a:spLocks noGrp="1"/>
-          </p:cNvSpPr>
-          <p:nvPr>
-            <p:ph idx="1"/>
-          </p:nvPr>
-        </p:nvSpPr>
-        <p:spPr>
+          </a:blip>
+          <a:srcRect/>
+          <a:stretch>
+            <a:fillRect/>
+          </a:stretch>
+        </p:blipFill>
+        <p:spPr bwMode="auto">
           <a:xfrm>
-            <a:off x="4654295" y="816638"/>
-            <a:ext cx="4619706" cy="5224724"/>
+            <a:off x="2209398" y="2301412"/>
+            <a:ext cx="5995580" cy="3188824"/>
           </a:xfrm>
+          <a:prstGeom prst="rect">
+            <a:avLst/>
+          </a:prstGeom>
+          <a:noFill/>
+          <a:extLst>
+            <a:ext uri="{909E8E84-426E-40DD-AFC4-6F175D3DCCD1}">
+              <a14:hiddenFill xmlns:a14="http://schemas.microsoft.com/office/drawing/2010/main">
+                <a:solidFill>
+                  <a:srgbClr val="FFFFFF"/>
+                </a:solidFill>
+              </a14:hiddenFill>
+            </a:ext>
+          </a:extLst>
         </p:spPr>
-        <p:txBody>
-          <a:bodyPr anchor="ctr">
-            <a:normAutofit/>
-          </a:bodyPr>
-          <a:lstStyle/>
-          <a:p>
-            <a:r>
-              <a:rPr lang="en-US" dirty="0"/>
-              <a:t>GET – Receive something. No body. Parameters in request.</a:t>
-            </a:r>
-            <a:endParaRPr lang="en-US"/>
-          </a:p>
-          <a:p>
-            <a:r>
-              <a:rPr lang="en-US" dirty="0"/>
-              <a:t>POST – Add a new object. Data in body.</a:t>
-            </a:r>
-            <a:endParaRPr lang="en-US"/>
-          </a:p>
-          <a:p>
-            <a:r>
-              <a:rPr lang="en-US" dirty="0"/>
-              <a:t>PUT – Update an object. Data in body.</a:t>
-            </a:r>
-            <a:endParaRPr lang="en-US"/>
-          </a:p>
-          <a:p>
-            <a:r>
-              <a:rPr lang="en-US" dirty="0"/>
-              <a:t>DELETE – Deletes an object</a:t>
-            </a:r>
-            <a:endParaRPr lang="en-US"/>
-          </a:p>
-        </p:txBody>
-      </p:sp>
+      </p:pic>
     </p:spTree>
     <p:extLst>
       <p:ext uri="{BB962C8B-B14F-4D97-AF65-F5344CB8AC3E}">
-        <p14:creationId xmlns:p14="http://schemas.microsoft.com/office/powerpoint/2010/main" val="3093539712"/>
+        <p14:creationId xmlns:p14="http://schemas.microsoft.com/office/powerpoint/2010/main" val="2619250475"/>
       </p:ext>
     </p:extLst>
   </p:cSld>
@@ -8786,23 +9114,9 @@
 <file path=ppt/slides/slide4.xml><?xml version="1.0" encoding="utf-8"?>
 <p:sld xmlns:a="http://schemas.openxmlformats.org/drawingml/2006/main" xmlns:r="http://schemas.openxmlformats.org/officeDocument/2006/relationships" xmlns:p="http://schemas.openxmlformats.org/presentationml/2006/main">
   <p:cSld>
-    <p:bg>
-      <p:bgPr>
-        <a:solidFill>
-          <a:schemeClr val="bg1"/>
-        </a:solidFill>
-        <a:effectLst/>
-      </p:bgPr>
-    </p:bg>
     <p:spTree>
       <p:nvGrpSpPr>
-        <p:cNvPr id="1" name="">
-          <a:extLst>
-            <a:ext uri="{FF2B5EF4-FFF2-40B4-BE49-F238E27FC236}">
-              <a16:creationId xmlns:a16="http://schemas.microsoft.com/office/drawing/2014/main" id="{513C89A2-A76C-17DA-1F16-D8D5BD5A3938}"/>
-            </a:ext>
-          </a:extLst>
-        </p:cNvPr>
+        <p:cNvPr id="1" name=""/>
         <p:cNvGrpSpPr/>
         <p:nvPr/>
       </p:nvGrpSpPr>
@@ -8814,165 +9128,125 @@
           <a:chExt cx="0" cy="0"/>
         </a:xfrm>
       </p:grpSpPr>
-      <p:cxnSp>
-        <p:nvCxnSpPr>
-          <p:cNvPr id="8" name="Straight Connector 7">
+      <p:sp>
+        <p:nvSpPr>
+          <p:cNvPr id="2" name="Title 1">
             <a:extLst>
               <a:ext uri="{FF2B5EF4-FFF2-40B4-BE49-F238E27FC236}">
-                <a16:creationId xmlns:a16="http://schemas.microsoft.com/office/drawing/2014/main" id="{0B5F7E3B-C5F1-40E0-A491-558BAFBC1127}"/>
-              </a:ext>
-              <a:ext uri="{C183D7F6-B498-43B3-948B-1728B52AA6E4}">
-                <adec:decorative xmlns:adec="http://schemas.microsoft.com/office/drawing/2017/decorative" val="1"/>
+                <a16:creationId xmlns:a16="http://schemas.microsoft.com/office/drawing/2014/main" id="{A0FB8235-66BE-182E-F931-9758C6BB5A77}"/>
               </a:ext>
             </a:extLst>
           </p:cNvPr>
-          <p:cNvCxnSpPr>
-            <a:cxnSpLocks noGrp="1" noRot="1" noChangeAspect="1" noMove="1" noResize="1" noEditPoints="1" noAdjustHandles="1" noChangeArrowheads="1" noChangeShapeType="1"/>
-          </p:cNvCxnSpPr>
-          <p:nvPr>
-            <p:extLst>
-              <p:ext uri="{386F3935-93C4-4BCD-93E2-E3B085C9AB24}">
-                <p16:designElem xmlns:p16="http://schemas.microsoft.com/office/powerpoint/2015/main" val="1"/>
-              </p:ext>
-            </p:extLst>
-          </p:nvPr>
-        </p:nvCxnSpPr>
+          <p:cNvSpPr>
+            <a:spLocks noGrp="1"/>
+          </p:cNvSpPr>
+          <p:nvPr>
+            <p:ph type="title"/>
+          </p:nvPr>
+        </p:nvSpPr>
+        <p:spPr/>
+        <p:txBody>
+          <a:bodyPr/>
+          <a:lstStyle/>
+          <a:p>
+            <a:r>
+              <a:rPr lang="en-US" dirty="0"/>
+              <a:t>JSON</a:t>
+            </a:r>
+          </a:p>
+        </p:txBody>
+      </p:sp>
+      <p:sp>
+        <p:nvSpPr>
+          <p:cNvPr id="3" name="Content Placeholder 2">
+            <a:extLst>
+              <a:ext uri="{FF2B5EF4-FFF2-40B4-BE49-F238E27FC236}">
+                <a16:creationId xmlns:a16="http://schemas.microsoft.com/office/drawing/2014/main" id="{2251D7E3-5B4D-A1CD-3D4E-6C735044D01B}"/>
+              </a:ext>
+            </a:extLst>
+          </p:cNvPr>
+          <p:cNvSpPr>
+            <a:spLocks noGrp="1"/>
+          </p:cNvSpPr>
+          <p:nvPr>
+            <p:ph idx="1"/>
+          </p:nvPr>
+        </p:nvSpPr>
+        <p:spPr/>
+        <p:txBody>
+          <a:bodyPr/>
+          <a:lstStyle/>
+          <a:p>
+            <a:r>
+              <a:rPr lang="en-US" dirty="0" err="1"/>
+              <a:t>Javascript</a:t>
+            </a:r>
+            <a:r>
+              <a:rPr lang="en-US" dirty="0"/>
+              <a:t> Object Notation</a:t>
+            </a:r>
+          </a:p>
+          <a:p>
+            <a:r>
+              <a:rPr lang="en-US" dirty="0"/>
+              <a:t>A textual representation of an object</a:t>
+            </a:r>
+          </a:p>
+          <a:p>
+            <a:r>
+              <a:rPr lang="en-US" dirty="0"/>
+              <a:t>Used to pass data between entities through the internet</a:t>
+            </a:r>
+          </a:p>
+          <a:p>
+            <a:r>
+              <a:rPr lang="en-US" dirty="0"/>
+              <a:t>We’ll use it to receive and send data about our TODO items</a:t>
+            </a:r>
+          </a:p>
+          <a:p>
+            <a:r>
+              <a:rPr lang="en-US" dirty="0"/>
+              <a:t>It’s up to the “Client” to decide how it displays it</a:t>
+            </a:r>
+          </a:p>
+        </p:txBody>
+      </p:sp>
+      <p:pic>
+        <p:nvPicPr>
+          <p:cNvPr id="5" name="Picture 4">
+            <a:extLst>
+              <a:ext uri="{FF2B5EF4-FFF2-40B4-BE49-F238E27FC236}">
+                <a16:creationId xmlns:a16="http://schemas.microsoft.com/office/drawing/2014/main" id="{477FBE58-13C9-DD7E-BB2E-747540E290F0}"/>
+              </a:ext>
+            </a:extLst>
+          </p:cNvPr>
+          <p:cNvPicPr>
+            <a:picLocks noChangeAspect="1"/>
+          </p:cNvPicPr>
+          <p:nvPr/>
+        </p:nvPicPr>
+        <p:blipFill>
+          <a:blip r:embed="rId2"/>
+          <a:srcRect r="55657"/>
+          <a:stretch>
+            <a:fillRect/>
+          </a:stretch>
+        </p:blipFill>
         <p:spPr>
           <a:xfrm>
-            <a:off x="4241804" y="1460500"/>
-            <a:ext cx="0" cy="3937000"/>
+            <a:off x="4027470" y="4573540"/>
+            <a:ext cx="2661008" cy="1738390"/>
           </a:xfrm>
-          <a:prstGeom prst="line">
+          <a:prstGeom prst="rect">
             <a:avLst/>
           </a:prstGeom>
         </p:spPr>
-        <p:style>
-          <a:lnRef idx="1">
-            <a:schemeClr val="accent1"/>
-          </a:lnRef>
-          <a:fillRef idx="0">
-            <a:schemeClr val="accent1"/>
-          </a:fillRef>
-          <a:effectRef idx="0">
-            <a:schemeClr val="accent1"/>
-          </a:effectRef>
-          <a:fontRef idx="minor">
-            <a:schemeClr val="tx1"/>
-          </a:fontRef>
-        </p:style>
-      </p:cxnSp>
-      <p:sp>
-        <p:nvSpPr>
-          <p:cNvPr id="2" name="Title 1">
-            <a:extLst>
-              <a:ext uri="{FF2B5EF4-FFF2-40B4-BE49-F238E27FC236}">
-                <a16:creationId xmlns:a16="http://schemas.microsoft.com/office/drawing/2014/main" id="{073CC3AB-55F5-3C34-253D-0F4FC6C5019A}"/>
-              </a:ext>
-            </a:extLst>
-          </p:cNvPr>
-          <p:cNvSpPr>
-            <a:spLocks noGrp="1"/>
-          </p:cNvSpPr>
-          <p:nvPr>
-            <p:ph type="title"/>
-          </p:nvPr>
-        </p:nvSpPr>
-        <p:spPr>
-          <a:xfrm>
-            <a:off x="643467" y="816638"/>
-            <a:ext cx="3367359" cy="5224724"/>
-          </a:xfrm>
-        </p:spPr>
-        <p:txBody>
-          <a:bodyPr anchor="ctr">
-            <a:normAutofit/>
-          </a:bodyPr>
-          <a:lstStyle/>
-          <a:p>
-            <a:r>
-              <a:rPr lang="en-US" dirty="0"/>
-              <a:t>HTTP Standards – Requests </a:t>
-            </a:r>
-          </a:p>
-        </p:txBody>
-      </p:sp>
-      <p:sp>
-        <p:nvSpPr>
-          <p:cNvPr id="3" name="Content Placeholder 2">
-            <a:extLst>
-              <a:ext uri="{FF2B5EF4-FFF2-40B4-BE49-F238E27FC236}">
-                <a16:creationId xmlns:a16="http://schemas.microsoft.com/office/drawing/2014/main" id="{1EA90904-3148-38C7-F02D-833532B70184}"/>
-              </a:ext>
-            </a:extLst>
-          </p:cNvPr>
-          <p:cNvSpPr>
-            <a:spLocks noGrp="1"/>
-          </p:cNvSpPr>
-          <p:nvPr>
-            <p:ph idx="1"/>
-          </p:nvPr>
-        </p:nvSpPr>
-        <p:spPr>
-          <a:xfrm>
-            <a:off x="4654295" y="816638"/>
-            <a:ext cx="4619706" cy="5224724"/>
-          </a:xfrm>
-        </p:spPr>
-        <p:txBody>
-          <a:bodyPr anchor="ctr">
-            <a:normAutofit/>
-          </a:bodyPr>
-          <a:lstStyle/>
-          <a:p>
-            <a:r>
-              <a:rPr lang="en-US" dirty="0"/>
-              <a:t>GET – Receive something. No body. Parameters in request.</a:t>
-            </a:r>
-            <a:endParaRPr lang="en-US"/>
-          </a:p>
-          <a:p>
-            <a:r>
-              <a:rPr lang="en-US" dirty="0"/>
-              <a:t>POST – Add a new object. Data in body.</a:t>
-            </a:r>
-            <a:endParaRPr lang="en-US"/>
-          </a:p>
-          <a:p>
-            <a:pPr lvl="1"/>
-            <a:r>
-              <a:rPr lang="en-US" dirty="0"/>
-              <a:t>Twice the same request – The second should fail</a:t>
-            </a:r>
-            <a:endParaRPr lang="en-US"/>
-          </a:p>
-          <a:p>
-            <a:r>
-              <a:rPr lang="en-US" dirty="0"/>
-              <a:t>PUT – Update an object. Data in body.</a:t>
-            </a:r>
-            <a:endParaRPr lang="en-US"/>
-          </a:p>
-          <a:p>
-            <a:pPr lvl="1"/>
-            <a:r>
-              <a:rPr lang="en-US" dirty="0"/>
-              <a:t>Twice the same request – Twice the same response</a:t>
-            </a:r>
-            <a:endParaRPr lang="en-US"/>
-          </a:p>
-          <a:p>
-            <a:r>
-              <a:rPr lang="en-US" dirty="0"/>
-              <a:t>DELETE – Deletes an object</a:t>
-            </a:r>
-            <a:endParaRPr lang="en-US"/>
-          </a:p>
-        </p:txBody>
-      </p:sp>
+      </p:pic>
     </p:spTree>
     <p:extLst>
       <p:ext uri="{BB962C8B-B14F-4D97-AF65-F5344CB8AC3E}">
-        <p14:creationId xmlns:p14="http://schemas.microsoft.com/office/powerpoint/2010/main" val="59194251"/>
+        <p14:creationId xmlns:p14="http://schemas.microsoft.com/office/powerpoint/2010/main" val="1685312732"/>
       </p:ext>
     </p:extLst>
   </p:cSld>
@@ -9059,7 +9333,7 @@
           <p:cNvPr id="2" name="Title 1">
             <a:extLst>
               <a:ext uri="{FF2B5EF4-FFF2-40B4-BE49-F238E27FC236}">
-                <a16:creationId xmlns:a16="http://schemas.microsoft.com/office/drawing/2014/main" id="{0BC81FD3-F3DF-52B9-2D6F-E520F7422E85}"/>
+                <a16:creationId xmlns:a16="http://schemas.microsoft.com/office/drawing/2014/main" id="{82467D4D-0B05-6CD8-8804-D2067424D4F2}"/>
               </a:ext>
             </a:extLst>
           </p:cNvPr>
@@ -9084,7 +9358,7 @@
           <a:p>
             <a:r>
               <a:rPr lang="en-US" dirty="0"/>
-              <a:t>HTTP Standards - Responses</a:t>
+              <a:t>HTTP Standards – Requests </a:t>
             </a:r>
           </a:p>
         </p:txBody>
@@ -9094,7 +9368,7 @@
           <p:cNvPr id="3" name="Content Placeholder 2">
             <a:extLst>
               <a:ext uri="{FF2B5EF4-FFF2-40B4-BE49-F238E27FC236}">
-                <a16:creationId xmlns:a16="http://schemas.microsoft.com/office/drawing/2014/main" id="{A462DFAC-65C9-F01E-C689-07664D370C8E}"/>
+                <a16:creationId xmlns:a16="http://schemas.microsoft.com/office/drawing/2014/main" id="{4BC7D8F3-2B06-8B9A-AE4B-4082ADFB44DC}"/>
               </a:ext>
             </a:extLst>
           </p:cNvPr>
@@ -9119,28 +9393,28 @@
           <a:p>
             <a:r>
               <a:rPr lang="en-US" dirty="0"/>
-              <a:t>2XX – OK</a:t>
+              <a:t>GET – Receive something. No body. Parameters in request.</a:t>
             </a:r>
             <a:endParaRPr lang="en-US"/>
           </a:p>
           <a:p>
             <a:r>
               <a:rPr lang="en-US" dirty="0"/>
-              <a:t>3XX – Redirects (we won’t use this)</a:t>
+              <a:t>POST – Add a new object. Data in body.</a:t>
             </a:r>
             <a:endParaRPr lang="en-US"/>
           </a:p>
           <a:p>
             <a:r>
               <a:rPr lang="en-US" dirty="0"/>
-              <a:t>4XX – Client error. If the user sends the same request again, it will fail again. No point in retrying. (429*)</a:t>
+              <a:t>PUT – Update an object. Data in body.</a:t>
             </a:r>
             <a:endParaRPr lang="en-US"/>
           </a:p>
           <a:p>
             <a:r>
               <a:rPr lang="en-US" dirty="0"/>
-              <a:t>5XX – Server error. The user should retry the request</a:t>
+              <a:t>DELETE – Deletes an object</a:t>
             </a:r>
             <a:endParaRPr lang="en-US"/>
           </a:p>
@@ -9149,7 +9423,7 @@
     </p:spTree>
     <p:extLst>
       <p:ext uri="{BB962C8B-B14F-4D97-AF65-F5344CB8AC3E}">
-        <p14:creationId xmlns:p14="http://schemas.microsoft.com/office/powerpoint/2010/main" val="3827338999"/>
+        <p14:creationId xmlns:p14="http://schemas.microsoft.com/office/powerpoint/2010/main" val="3093539712"/>
       </p:ext>
     </p:extLst>
   </p:cSld>
@@ -9162,6 +9436,213 @@
 <file path=ppt/slides/slide6.xml><?xml version="1.0" encoding="utf-8"?>
 <p:sld xmlns:a="http://schemas.openxmlformats.org/drawingml/2006/main" xmlns:r="http://schemas.openxmlformats.org/officeDocument/2006/relationships" xmlns:p="http://schemas.openxmlformats.org/presentationml/2006/main">
   <p:cSld>
+    <p:bg>
+      <p:bgPr>
+        <a:solidFill>
+          <a:schemeClr val="bg1"/>
+        </a:solidFill>
+        <a:effectLst/>
+      </p:bgPr>
+    </p:bg>
+    <p:spTree>
+      <p:nvGrpSpPr>
+        <p:cNvPr id="1" name="">
+          <a:extLst>
+            <a:ext uri="{FF2B5EF4-FFF2-40B4-BE49-F238E27FC236}">
+              <a16:creationId xmlns:a16="http://schemas.microsoft.com/office/drawing/2014/main" id="{513C89A2-A76C-17DA-1F16-D8D5BD5A3938}"/>
+            </a:ext>
+          </a:extLst>
+        </p:cNvPr>
+        <p:cNvGrpSpPr/>
+        <p:nvPr/>
+      </p:nvGrpSpPr>
+      <p:grpSpPr>
+        <a:xfrm>
+          <a:off x="0" y="0"/>
+          <a:ext cx="0" cy="0"/>
+          <a:chOff x="0" y="0"/>
+          <a:chExt cx="0" cy="0"/>
+        </a:xfrm>
+      </p:grpSpPr>
+      <p:cxnSp>
+        <p:nvCxnSpPr>
+          <p:cNvPr id="8" name="Straight Connector 7">
+            <a:extLst>
+              <a:ext uri="{FF2B5EF4-FFF2-40B4-BE49-F238E27FC236}">
+                <a16:creationId xmlns:a16="http://schemas.microsoft.com/office/drawing/2014/main" id="{0B5F7E3B-C5F1-40E0-A491-558BAFBC1127}"/>
+              </a:ext>
+              <a:ext uri="{C183D7F6-B498-43B3-948B-1728B52AA6E4}">
+                <adec:decorative xmlns:adec="http://schemas.microsoft.com/office/drawing/2017/decorative" val="1"/>
+              </a:ext>
+            </a:extLst>
+          </p:cNvPr>
+          <p:cNvCxnSpPr>
+            <a:cxnSpLocks noGrp="1" noRot="1" noChangeAspect="1" noMove="1" noResize="1" noEditPoints="1" noAdjustHandles="1" noChangeArrowheads="1" noChangeShapeType="1"/>
+          </p:cNvCxnSpPr>
+          <p:nvPr>
+            <p:extLst>
+              <p:ext uri="{386F3935-93C4-4BCD-93E2-E3B085C9AB24}">
+                <p16:designElem xmlns:p16="http://schemas.microsoft.com/office/powerpoint/2015/main" val="1"/>
+              </p:ext>
+            </p:extLst>
+          </p:nvPr>
+        </p:nvCxnSpPr>
+        <p:spPr>
+          <a:xfrm>
+            <a:off x="4241804" y="1460500"/>
+            <a:ext cx="0" cy="3937000"/>
+          </a:xfrm>
+          <a:prstGeom prst="line">
+            <a:avLst/>
+          </a:prstGeom>
+        </p:spPr>
+        <p:style>
+          <a:lnRef idx="1">
+            <a:schemeClr val="accent1"/>
+          </a:lnRef>
+          <a:fillRef idx="0">
+            <a:schemeClr val="accent1"/>
+          </a:fillRef>
+          <a:effectRef idx="0">
+            <a:schemeClr val="accent1"/>
+          </a:effectRef>
+          <a:fontRef idx="minor">
+            <a:schemeClr val="tx1"/>
+          </a:fontRef>
+        </p:style>
+      </p:cxnSp>
+      <p:sp>
+        <p:nvSpPr>
+          <p:cNvPr id="2" name="Title 1">
+            <a:extLst>
+              <a:ext uri="{FF2B5EF4-FFF2-40B4-BE49-F238E27FC236}">
+                <a16:creationId xmlns:a16="http://schemas.microsoft.com/office/drawing/2014/main" id="{073CC3AB-55F5-3C34-253D-0F4FC6C5019A}"/>
+              </a:ext>
+            </a:extLst>
+          </p:cNvPr>
+          <p:cNvSpPr>
+            <a:spLocks noGrp="1"/>
+          </p:cNvSpPr>
+          <p:nvPr>
+            <p:ph type="title"/>
+          </p:nvPr>
+        </p:nvSpPr>
+        <p:spPr>
+          <a:xfrm>
+            <a:off x="643467" y="816638"/>
+            <a:ext cx="3367359" cy="5224724"/>
+          </a:xfrm>
+        </p:spPr>
+        <p:txBody>
+          <a:bodyPr anchor="ctr">
+            <a:normAutofit/>
+          </a:bodyPr>
+          <a:lstStyle/>
+          <a:p>
+            <a:r>
+              <a:rPr lang="en-US" dirty="0"/>
+              <a:t>HTTP Standards – Requests </a:t>
+            </a:r>
+          </a:p>
+        </p:txBody>
+      </p:sp>
+      <p:sp>
+        <p:nvSpPr>
+          <p:cNvPr id="3" name="Content Placeholder 2">
+            <a:extLst>
+              <a:ext uri="{FF2B5EF4-FFF2-40B4-BE49-F238E27FC236}">
+                <a16:creationId xmlns:a16="http://schemas.microsoft.com/office/drawing/2014/main" id="{1EA90904-3148-38C7-F02D-833532B70184}"/>
+              </a:ext>
+            </a:extLst>
+          </p:cNvPr>
+          <p:cNvSpPr>
+            <a:spLocks noGrp="1"/>
+          </p:cNvSpPr>
+          <p:nvPr>
+            <p:ph idx="1"/>
+          </p:nvPr>
+        </p:nvSpPr>
+        <p:spPr>
+          <a:xfrm>
+            <a:off x="4654295" y="816638"/>
+            <a:ext cx="4619706" cy="5224724"/>
+          </a:xfrm>
+        </p:spPr>
+        <p:txBody>
+          <a:bodyPr anchor="ctr">
+            <a:normAutofit/>
+          </a:bodyPr>
+          <a:lstStyle/>
+          <a:p>
+            <a:r>
+              <a:rPr lang="en-US" dirty="0"/>
+              <a:t>GET – Receive something. No body. Parameters in request.</a:t>
+            </a:r>
+            <a:endParaRPr lang="en-US"/>
+          </a:p>
+          <a:p>
+            <a:r>
+              <a:rPr lang="en-US" dirty="0"/>
+              <a:t>POST – Add a new object. Data in body.</a:t>
+            </a:r>
+            <a:endParaRPr lang="en-US"/>
+          </a:p>
+          <a:p>
+            <a:pPr lvl="1"/>
+            <a:r>
+              <a:rPr lang="en-US" dirty="0"/>
+              <a:t>Twice the same request – The second should fail</a:t>
+            </a:r>
+            <a:endParaRPr lang="en-US"/>
+          </a:p>
+          <a:p>
+            <a:r>
+              <a:rPr lang="en-US" dirty="0"/>
+              <a:t>PUT – Update an object. Data in body.</a:t>
+            </a:r>
+            <a:endParaRPr lang="en-US"/>
+          </a:p>
+          <a:p>
+            <a:pPr lvl="1"/>
+            <a:r>
+              <a:rPr lang="en-US" dirty="0"/>
+              <a:t>Twice the same request – Twice the same response</a:t>
+            </a:r>
+            <a:endParaRPr lang="en-US"/>
+          </a:p>
+          <a:p>
+            <a:r>
+              <a:rPr lang="en-US" dirty="0"/>
+              <a:t>DELETE – Deletes an object</a:t>
+            </a:r>
+            <a:endParaRPr lang="en-US"/>
+          </a:p>
+        </p:txBody>
+      </p:sp>
+    </p:spTree>
+    <p:extLst>
+      <p:ext uri="{BB962C8B-B14F-4D97-AF65-F5344CB8AC3E}">
+        <p14:creationId xmlns:p14="http://schemas.microsoft.com/office/powerpoint/2010/main" val="59194251"/>
+      </p:ext>
+    </p:extLst>
+  </p:cSld>
+  <p:clrMapOvr>
+    <a:masterClrMapping/>
+  </p:clrMapOvr>
+</p:sld>
+</file>
+
+<file path=ppt/slides/slide7.xml><?xml version="1.0" encoding="utf-8"?>
+<p:sld xmlns:a="http://schemas.openxmlformats.org/drawingml/2006/main" xmlns:r="http://schemas.openxmlformats.org/officeDocument/2006/relationships" xmlns:p="http://schemas.openxmlformats.org/presentationml/2006/main">
+  <p:cSld>
+    <p:bg>
+      <p:bgPr>
+        <a:solidFill>
+          <a:schemeClr val="bg1"/>
+        </a:solidFill>
+        <a:effectLst/>
+      </p:bgPr>
+    </p:bg>
     <p:spTree>
       <p:nvGrpSpPr>
         <p:cNvPr id="1" name=""/>
@@ -9176,12 +9657,59 @@
           <a:chExt cx="0" cy="0"/>
         </a:xfrm>
       </p:grpSpPr>
+      <p:cxnSp>
+        <p:nvCxnSpPr>
+          <p:cNvPr id="8" name="Straight Connector 7">
+            <a:extLst>
+              <a:ext uri="{FF2B5EF4-FFF2-40B4-BE49-F238E27FC236}">
+                <a16:creationId xmlns:a16="http://schemas.microsoft.com/office/drawing/2014/main" id="{0B5F7E3B-C5F1-40E0-A491-558BAFBC1127}"/>
+              </a:ext>
+              <a:ext uri="{C183D7F6-B498-43B3-948B-1728B52AA6E4}">
+                <adec:decorative xmlns:adec="http://schemas.microsoft.com/office/drawing/2017/decorative" val="1"/>
+              </a:ext>
+            </a:extLst>
+          </p:cNvPr>
+          <p:cNvCxnSpPr>
+            <a:cxnSpLocks noGrp="1" noRot="1" noChangeAspect="1" noMove="1" noResize="1" noEditPoints="1" noAdjustHandles="1" noChangeArrowheads="1" noChangeShapeType="1"/>
+          </p:cNvCxnSpPr>
+          <p:nvPr>
+            <p:extLst>
+              <p:ext uri="{386F3935-93C4-4BCD-93E2-E3B085C9AB24}">
+                <p16:designElem xmlns:p16="http://schemas.microsoft.com/office/powerpoint/2015/main" val="1"/>
+              </p:ext>
+            </p:extLst>
+          </p:nvPr>
+        </p:nvCxnSpPr>
+        <p:spPr>
+          <a:xfrm>
+            <a:off x="4241804" y="1460500"/>
+            <a:ext cx="0" cy="3937000"/>
+          </a:xfrm>
+          <a:prstGeom prst="line">
+            <a:avLst/>
+          </a:prstGeom>
+        </p:spPr>
+        <p:style>
+          <a:lnRef idx="1">
+            <a:schemeClr val="accent1"/>
+          </a:lnRef>
+          <a:fillRef idx="0">
+            <a:schemeClr val="accent1"/>
+          </a:fillRef>
+          <a:effectRef idx="0">
+            <a:schemeClr val="accent1"/>
+          </a:effectRef>
+          <a:fontRef idx="minor">
+            <a:schemeClr val="tx1"/>
+          </a:fontRef>
+        </p:style>
+      </p:cxnSp>
       <p:sp>
         <p:nvSpPr>
           <p:cNvPr id="2" name="Title 1">
             <a:extLst>
               <a:ext uri="{FF2B5EF4-FFF2-40B4-BE49-F238E27FC236}">
-                <a16:creationId xmlns:a16="http://schemas.microsoft.com/office/drawing/2014/main" id="{CF78E5AA-DBBF-FF1A-61B7-0B514ABCA685}"/>
+                <a16:creationId xmlns:a16="http://schemas.microsoft.com/office/drawing/2014/main" id="{0BC81FD3-F3DF-52B9-2D6F-E520F7422E85}"/>
               </a:ext>
             </a:extLst>
           </p:cNvPr>
@@ -9192,14 +9720,21 @@
             <p:ph type="title"/>
           </p:nvPr>
         </p:nvSpPr>
-        <p:spPr/>
-        <p:txBody>
-          <a:bodyPr/>
-          <a:lstStyle/>
-          <a:p>
-            <a:r>
-              <a:rPr lang="en-US" dirty="0"/>
-              <a:t>Swagger</a:t>
+        <p:spPr>
+          <a:xfrm>
+            <a:off x="643467" y="816638"/>
+            <a:ext cx="3367359" cy="5224724"/>
+          </a:xfrm>
+        </p:spPr>
+        <p:txBody>
+          <a:bodyPr anchor="ctr">
+            <a:normAutofit/>
+          </a:bodyPr>
+          <a:lstStyle/>
+          <a:p>
+            <a:r>
+              <a:rPr lang="en-US" dirty="0"/>
+              <a:t>HTTP Standards - Responses</a:t>
             </a:r>
           </a:p>
         </p:txBody>
@@ -9209,7 +9744,7 @@
           <p:cNvPr id="3" name="Content Placeholder 2">
             <a:extLst>
               <a:ext uri="{FF2B5EF4-FFF2-40B4-BE49-F238E27FC236}">
-                <a16:creationId xmlns:a16="http://schemas.microsoft.com/office/drawing/2014/main" id="{8AD4BDD5-B308-6403-506F-6970F4FEBF51}"/>
+                <a16:creationId xmlns:a16="http://schemas.microsoft.com/office/drawing/2014/main" id="{A462DFAC-65C9-F01E-C689-07664D370C8E}"/>
               </a:ext>
             </a:extLst>
           </p:cNvPr>
@@ -9220,40 +9755,51 @@
             <p:ph idx="1"/>
           </p:nvPr>
         </p:nvSpPr>
-        <p:spPr/>
-        <p:txBody>
-          <a:bodyPr/>
-          <a:lstStyle/>
-          <a:p>
-            <a:r>
-              <a:rPr lang="en-US" dirty="0"/>
-              <a:t>A JSON document that allows computers and humans to describe an API</a:t>
-            </a:r>
-          </a:p>
-          <a:p>
-            <a:r>
-              <a:rPr lang="en-US" dirty="0"/>
-              <a:t>Can be automatically or manually generated</a:t>
-            </a:r>
-          </a:p>
-          <a:p>
-            <a:r>
-              <a:rPr lang="en-US" dirty="0"/>
-              <a:t>Automatic in C# </a:t>
-            </a:r>
-            <a:r>
-              <a:rPr lang="en-US" dirty="0">
-                <a:sym typeface="Wingdings" panose="05000000000000000000" pitchFamily="2" charset="2"/>
-              </a:rPr>
-              <a:t></a:t>
-            </a:r>
-          </a:p>
-          <a:p>
-            <a:r>
-              <a:rPr lang="en-US" dirty="0">
-                <a:sym typeface="Wingdings" panose="05000000000000000000" pitchFamily="2" charset="2"/>
-              </a:rPr>
-              <a:t>Creates a nice UI for development (and production…)</a:t>
+        <p:spPr>
+          <a:xfrm>
+            <a:off x="4654295" y="816638"/>
+            <a:ext cx="4619706" cy="5224724"/>
+          </a:xfrm>
+        </p:spPr>
+        <p:txBody>
+          <a:bodyPr anchor="ctr">
+            <a:normAutofit/>
+          </a:bodyPr>
+          <a:lstStyle/>
+          <a:p>
+            <a:r>
+              <a:rPr lang="en-US" dirty="0"/>
+              <a:t>2XX – OK</a:t>
+            </a:r>
+          </a:p>
+          <a:p>
+            <a:r>
+              <a:rPr lang="en-US" dirty="0"/>
+              <a:t>3XX – Redirects (we won’t use this)</a:t>
+            </a:r>
+          </a:p>
+          <a:p>
+            <a:r>
+              <a:rPr lang="en-US" dirty="0"/>
+              <a:t>4XX – Client error. If the user sends the same request again, it will fail again. </a:t>
+            </a:r>
+            <a:r>
+              <a:rPr lang="en-US" b="1" dirty="0"/>
+              <a:t>No point in retrying</a:t>
+            </a:r>
+            <a:r>
+              <a:rPr lang="en-US" dirty="0"/>
+              <a:t>. (429*)</a:t>
+            </a:r>
+          </a:p>
+          <a:p>
+            <a:r>
+              <a:rPr lang="en-US" dirty="0"/>
+              <a:t>5XX – Server error. </a:t>
+            </a:r>
+            <a:r>
+              <a:rPr lang="en-US" b="1" dirty="0"/>
+              <a:t>The user should retry the request.</a:t>
             </a:r>
           </a:p>
         </p:txBody>
@@ -9261,96 +9807,7 @@
     </p:spTree>
     <p:extLst>
       <p:ext uri="{BB962C8B-B14F-4D97-AF65-F5344CB8AC3E}">
-        <p14:creationId xmlns:p14="http://schemas.microsoft.com/office/powerpoint/2010/main" val="613230179"/>
-      </p:ext>
-    </p:extLst>
-  </p:cSld>
-  <p:clrMapOvr>
-    <a:masterClrMapping/>
-  </p:clrMapOvr>
-</p:sld>
-</file>
-
-<file path=ppt/slides/slide7.xml><?xml version="1.0" encoding="utf-8"?>
-<p:sld xmlns:a="http://schemas.openxmlformats.org/drawingml/2006/main" xmlns:r="http://schemas.openxmlformats.org/officeDocument/2006/relationships" xmlns:p="http://schemas.openxmlformats.org/presentationml/2006/main">
-  <p:cSld>
-    <p:spTree>
-      <p:nvGrpSpPr>
-        <p:cNvPr id="1" name=""/>
-        <p:cNvGrpSpPr/>
-        <p:nvPr/>
-      </p:nvGrpSpPr>
-      <p:grpSpPr>
-        <a:xfrm>
-          <a:off x="0" y="0"/>
-          <a:ext cx="0" cy="0"/>
-          <a:chOff x="0" y="0"/>
-          <a:chExt cx="0" cy="0"/>
-        </a:xfrm>
-      </p:grpSpPr>
-      <p:sp>
-        <p:nvSpPr>
-          <p:cNvPr id="4" name="Title 3">
-            <a:extLst>
-              <a:ext uri="{FF2B5EF4-FFF2-40B4-BE49-F238E27FC236}">
-                <a16:creationId xmlns:a16="http://schemas.microsoft.com/office/drawing/2014/main" id="{F77D837D-2144-DEB3-93E4-693FCBA58E79}"/>
-              </a:ext>
-            </a:extLst>
-          </p:cNvPr>
-          <p:cNvSpPr>
-            <a:spLocks noGrp="1"/>
-          </p:cNvSpPr>
-          <p:nvPr>
-            <p:ph type="ctrTitle"/>
-          </p:nvPr>
-        </p:nvSpPr>
-        <p:spPr>
-          <a:xfrm>
-            <a:off x="1089329" y="2404534"/>
-            <a:ext cx="8602412" cy="1646302"/>
-          </a:xfrm>
-        </p:spPr>
-        <p:txBody>
-          <a:bodyPr/>
-          <a:lstStyle/>
-          <a:p>
-            <a:pPr algn="ctr"/>
-            <a:r>
-              <a:rPr lang="en-US" dirty="0"/>
-              <a:t>LET’S SEE THIS IN ACTION</a:t>
-            </a:r>
-          </a:p>
-        </p:txBody>
-      </p:sp>
-      <p:sp>
-        <p:nvSpPr>
-          <p:cNvPr id="5" name="Subtitle 4">
-            <a:extLst>
-              <a:ext uri="{FF2B5EF4-FFF2-40B4-BE49-F238E27FC236}">
-                <a16:creationId xmlns:a16="http://schemas.microsoft.com/office/drawing/2014/main" id="{1475225B-C89F-59BE-A551-A06B486E17B4}"/>
-              </a:ext>
-            </a:extLst>
-          </p:cNvPr>
-          <p:cNvSpPr>
-            <a:spLocks noGrp="1"/>
-          </p:cNvSpPr>
-          <p:nvPr>
-            <p:ph type="subTitle" idx="1"/>
-          </p:nvPr>
-        </p:nvSpPr>
-        <p:spPr/>
-        <p:txBody>
-          <a:bodyPr/>
-          <a:lstStyle/>
-          <a:p>
-            <a:endParaRPr lang="en-US" dirty="0"/>
-          </a:p>
-        </p:txBody>
-      </p:sp>
-    </p:spTree>
-    <p:extLst>
-      <p:ext uri="{BB962C8B-B14F-4D97-AF65-F5344CB8AC3E}">
-        <p14:creationId xmlns:p14="http://schemas.microsoft.com/office/powerpoint/2010/main" val="928242097"/>
+        <p14:creationId xmlns:p14="http://schemas.microsoft.com/office/powerpoint/2010/main" val="3827338999"/>
       </p:ext>
     </p:extLst>
   </p:cSld>
@@ -9382,7 +9839,7 @@
           <p:cNvPr id="2" name="Title 1">
             <a:extLst>
               <a:ext uri="{FF2B5EF4-FFF2-40B4-BE49-F238E27FC236}">
-                <a16:creationId xmlns:a16="http://schemas.microsoft.com/office/drawing/2014/main" id="{0ED21ADA-27F5-0BD9-733A-48F9C0C16BC0}"/>
+                <a16:creationId xmlns:a16="http://schemas.microsoft.com/office/drawing/2014/main" id="{CF78E5AA-DBBF-FF1A-61B7-0B514ABCA685}"/>
               </a:ext>
             </a:extLst>
           </p:cNvPr>
@@ -9400,7 +9857,7 @@
           <a:p>
             <a:r>
               <a:rPr lang="en-US" dirty="0"/>
-              <a:t>Attributes</a:t>
+              <a:t>Swagger</a:t>
             </a:r>
           </a:p>
         </p:txBody>
@@ -9410,7 +9867,7 @@
           <p:cNvPr id="3" name="Content Placeholder 2">
             <a:extLst>
               <a:ext uri="{FF2B5EF4-FFF2-40B4-BE49-F238E27FC236}">
-                <a16:creationId xmlns:a16="http://schemas.microsoft.com/office/drawing/2014/main" id="{77386FB6-07CC-B2DE-CF0B-C0DA6121B4E8}"/>
+                <a16:creationId xmlns:a16="http://schemas.microsoft.com/office/drawing/2014/main" id="{8AD4BDD5-B308-6403-506F-6970F4FEBF51}"/>
               </a:ext>
             </a:extLst>
           </p:cNvPr>
@@ -9428,58 +9885,71 @@
           <a:p>
             <a:r>
               <a:rPr lang="en-US" dirty="0"/>
-              <a:t>[XXX] before class/methods/parameters definition</a:t>
-            </a:r>
-          </a:p>
-          <a:p>
-            <a:r>
-              <a:rPr lang="en-US" dirty="0"/>
-              <a:t>Provide Metadata to that entity</a:t>
-            </a:r>
-          </a:p>
-          <a:p>
-            <a:pPr lvl="1"/>
-            <a:r>
-              <a:rPr lang="en-US" dirty="0"/>
-              <a:t>[Fact] – for testing</a:t>
-            </a:r>
-          </a:p>
-          <a:p>
-            <a:pPr lvl="1"/>
-            <a:r>
-              <a:rPr lang="en-US" dirty="0"/>
-              <a:t>[Obsolete] – for marking a function as obsolete</a:t>
-            </a:r>
-          </a:p>
-          <a:p>
-            <a:r>
-              <a:rPr lang="en-US" dirty="0"/>
-              <a:t>They don’t DO anything, but only provide Metadata</a:t>
-            </a:r>
-          </a:p>
-          <a:p>
-            <a:r>
-              <a:rPr lang="en-US" dirty="0"/>
-              <a:t>Other function might do something with it (like </a:t>
-            </a:r>
-            <a:r>
-              <a:rPr lang="en-US" dirty="0" err="1"/>
-              <a:t>xUnit</a:t>
-            </a:r>
-            <a:r>
-              <a:rPr lang="en-US" dirty="0"/>
-              <a:t> and [Fact])</a:t>
-            </a:r>
-          </a:p>
-          <a:p>
-            <a:endParaRPr lang="en-US" dirty="0"/>
-          </a:p>
-        </p:txBody>
-      </p:sp>
+              <a:t>A JSON document that allows computers and humans to describe an API</a:t>
+            </a:r>
+          </a:p>
+          <a:p>
+            <a:r>
+              <a:rPr lang="en-US" dirty="0"/>
+              <a:t>Can be automatically or manually generated</a:t>
+            </a:r>
+          </a:p>
+          <a:p>
+            <a:r>
+              <a:rPr lang="en-US" dirty="0"/>
+              <a:t>Automatic in C# </a:t>
+            </a:r>
+            <a:r>
+              <a:rPr lang="en-US" dirty="0">
+                <a:sym typeface="Wingdings" panose="05000000000000000000" pitchFamily="2" charset="2"/>
+              </a:rPr>
+              <a:t></a:t>
+            </a:r>
+          </a:p>
+          <a:p>
+            <a:r>
+              <a:rPr lang="en-US" dirty="0">
+                <a:sym typeface="Wingdings" panose="05000000000000000000" pitchFamily="2" charset="2"/>
+              </a:rPr>
+              <a:t>Creates a nice UI for development (and production…)</a:t>
+            </a:r>
+          </a:p>
+        </p:txBody>
+      </p:sp>
+      <p:pic>
+        <p:nvPicPr>
+          <p:cNvPr id="5" name="Picture 4">
+            <a:extLst>
+              <a:ext uri="{FF2B5EF4-FFF2-40B4-BE49-F238E27FC236}">
+                <a16:creationId xmlns:a16="http://schemas.microsoft.com/office/drawing/2014/main" id="{FB026A12-1C75-32E5-3F2E-4D4437243706}"/>
+              </a:ext>
+            </a:extLst>
+          </p:cNvPr>
+          <p:cNvPicPr>
+            <a:picLocks noChangeAspect="1"/>
+          </p:cNvPicPr>
+          <p:nvPr/>
+        </p:nvPicPr>
+        <p:blipFill>
+          <a:blip r:embed="rId2"/>
+          <a:stretch>
+            <a:fillRect/>
+          </a:stretch>
+        </p:blipFill>
+        <p:spPr>
+          <a:xfrm>
+            <a:off x="6943421" y="2848980"/>
+            <a:ext cx="4511280" cy="3399420"/>
+          </a:xfrm>
+          <a:prstGeom prst="rect">
+            <a:avLst/>
+          </a:prstGeom>
+        </p:spPr>
+      </p:pic>
     </p:spTree>
     <p:extLst>
       <p:ext uri="{BB962C8B-B14F-4D97-AF65-F5344CB8AC3E}">
-        <p14:creationId xmlns:p14="http://schemas.microsoft.com/office/powerpoint/2010/main" val="3190178724"/>
+        <p14:creationId xmlns:p14="http://schemas.microsoft.com/office/powerpoint/2010/main" val="613230179"/>
       </p:ext>
     </p:extLst>
   </p:cSld>
@@ -9508,10 +9978,10 @@
       </p:grpSpPr>
       <p:sp>
         <p:nvSpPr>
-          <p:cNvPr id="2" name="Title 1">
+          <p:cNvPr id="4" name="Title 3">
             <a:extLst>
               <a:ext uri="{FF2B5EF4-FFF2-40B4-BE49-F238E27FC236}">
-                <a16:creationId xmlns:a16="http://schemas.microsoft.com/office/drawing/2014/main" id="{6EBEA1BB-5A48-4BE3-7C5A-264E8C4CC593}"/>
+                <a16:creationId xmlns:a16="http://schemas.microsoft.com/office/drawing/2014/main" id="{F77D837D-2144-DEB3-93E4-693FCBA58E79}"/>
               </a:ext>
             </a:extLst>
           </p:cNvPr>
@@ -9519,27 +9989,33 @@
             <a:spLocks noGrp="1"/>
           </p:cNvSpPr>
           <p:nvPr>
-            <p:ph type="title"/>
-          </p:nvPr>
-        </p:nvSpPr>
-        <p:spPr/>
+            <p:ph type="ctrTitle"/>
+          </p:nvPr>
+        </p:nvSpPr>
+        <p:spPr>
+          <a:xfrm>
+            <a:off x="1089329" y="2404534"/>
+            <a:ext cx="8602412" cy="1646302"/>
+          </a:xfrm>
+        </p:spPr>
         <p:txBody>
           <a:bodyPr/>
           <a:lstStyle/>
           <a:p>
-            <a:r>
-              <a:rPr lang="en-US" dirty="0"/>
-              <a:t>Reflection</a:t>
-            </a:r>
-          </a:p>
-        </p:txBody>
-      </p:sp>
-      <p:sp>
-        <p:nvSpPr>
-          <p:cNvPr id="3" name="Content Placeholder 2">
+            <a:pPr algn="ctr"/>
+            <a:r>
+              <a:rPr lang="en-US" dirty="0"/>
+              <a:t>LET’S SEE THIS IN ACTION</a:t>
+            </a:r>
+          </a:p>
+        </p:txBody>
+      </p:sp>
+      <p:sp>
+        <p:nvSpPr>
+          <p:cNvPr id="5" name="Subtitle 4">
             <a:extLst>
               <a:ext uri="{FF2B5EF4-FFF2-40B4-BE49-F238E27FC236}">
-                <a16:creationId xmlns:a16="http://schemas.microsoft.com/office/drawing/2014/main" id="{F2AC46CC-057C-1591-1D62-48208B58D727}"/>
+                <a16:creationId xmlns:a16="http://schemas.microsoft.com/office/drawing/2014/main" id="{1475225B-C89F-59BE-A551-A06B486E17B4}"/>
               </a:ext>
             </a:extLst>
           </p:cNvPr>
@@ -9547,7 +10023,7 @@
             <a:spLocks noGrp="1"/>
           </p:cNvSpPr>
           <p:nvPr>
-            <p:ph idx="1"/>
+            <p:ph type="subTitle" idx="1"/>
           </p:nvPr>
         </p:nvSpPr>
         <p:spPr/>
@@ -9555,36 +10031,14 @@
           <a:bodyPr/>
           <a:lstStyle/>
           <a:p>
-            <a:r>
-              <a:rPr lang="en-US" dirty="0"/>
-              <a:t>Look at entities Metadata while running</a:t>
-            </a:r>
-          </a:p>
-          <a:p>
-            <a:r>
-              <a:rPr lang="en-US" dirty="0"/>
-              <a:t>A way to find classes, methods and create or invoke them</a:t>
-            </a:r>
-          </a:p>
-          <a:p>
-            <a:pPr lvl="1"/>
-            <a:r>
-              <a:rPr lang="en-US" dirty="0"/>
-              <a:t>Yes, private functions as well!</a:t>
-            </a:r>
-          </a:p>
-          <a:p>
-            <a:r>
-              <a:rPr lang="en-US" dirty="0"/>
-              <a:t>You must have a very good reason to do this!</a:t>
-            </a:r>
+            <a:endParaRPr lang="en-US" dirty="0"/>
           </a:p>
         </p:txBody>
       </p:sp>
     </p:spTree>
     <p:extLst>
       <p:ext uri="{BB962C8B-B14F-4D97-AF65-F5344CB8AC3E}">
-        <p14:creationId xmlns:p14="http://schemas.microsoft.com/office/powerpoint/2010/main" val="2396658276"/>
+        <p14:creationId xmlns:p14="http://schemas.microsoft.com/office/powerpoint/2010/main" val="928242097"/>
       </p:ext>
     </p:extLst>
   </p:cSld>

</xml_diff>